<commit_message>
updating pres, adding images
</commit_message>
<xml_diff>
--- a/Charting_New_Heights.pptx
+++ b/Charting_New_Heights.pptx
@@ -226,7 +226,7 @@
           <a:p>
             <a:fld id="{B56F32FC-4BD9-442A-A8C6-51598C909FE3}" type="datetimeFigureOut">
               <a:rPr lang="en-US" smtClean="0"/>
-              <a:t>11/16/2023</a:t>
+              <a:t>11/17/2023</a:t>
             </a:fld>
             <a:endParaRPr lang="en-US" dirty="0"/>
           </a:p>
@@ -403,7 +403,7 @@
           <a:p>
             <a:fld id="{056371FA-A98D-41E8-93F4-09945841298A}" type="datetimeFigureOut">
               <a:rPr lang="en-US" smtClean="0"/>
-              <a:t>11/16/2023</a:t>
+              <a:t>11/17/2023</a:t>
             </a:fld>
             <a:endParaRPr lang="en-US" dirty="0"/>
           </a:p>
@@ -9757,7 +9757,7 @@
             </a:pPr>
             <a:r>
               <a:rPr lang="en-US" sz="2000" dirty="0"/>
-              <a:t>Larger airplanes, go with Boeing</a:t>
+              <a:t>For larger airplanes, invest in Boeing</a:t>
             </a:r>
           </a:p>
           <a:p>
@@ -9929,13 +9929,21 @@
         </p:spPr>
         <p:txBody>
           <a:bodyPr>
-            <a:normAutofit/>
+            <a:normAutofit lnSpcReduction="10000"/>
           </a:bodyPr>
           <a:lstStyle/>
           <a:p>
             <a:r>
               <a:rPr lang="en-US" sz="1400" dirty="0"/>
-              <a:t>Find ROI for smaller &amp; larger airplanes for our company’s entrance into the market</a:t>
+              <a:t>Find ROI </a:t>
+            </a:r>
+            <a:r>
+              <a:rPr lang="en-US" dirty="0"/>
+              <a:t>comparing</a:t>
+            </a:r>
+            <a:r>
+              <a:rPr lang="en-US" sz="1400" dirty="0"/>
+              <a:t> smaller &amp; larger airplanes for our company’s entrance into the market</a:t>
             </a:r>
           </a:p>
         </p:txBody>
@@ -10070,20 +10078,28 @@
           <a:lstStyle/>
           <a:p>
             <a:r>
+              <a:rPr lang="en-US" dirty="0"/>
+              <a:t>C</a:t>
+            </a:r>
+            <a:r>
               <a:rPr lang="en-US" sz="1400" dirty="0"/>
-              <a:t>Analyze cost of repairs for planes involved in accidents</a:t>
-            </a:r>
-          </a:p>
-          <a:p>
+              <a:t>ost of repair or replacement</a:t>
+            </a:r>
+          </a:p>
+          <a:p>
+            <a:r>
+              <a:rPr lang="en-US" dirty="0"/>
+              <a:t>O</a:t>
+            </a:r>
             <a:r>
               <a:rPr lang="en-US" sz="1400" dirty="0"/>
-              <a:t>Analyze occurrence of accidents due to pilot error</a:t>
+              <a:t>ccurrence of accidents &amp; why</a:t>
             </a:r>
           </a:p>
           <a:p>
             <a:r>
               <a:rPr lang="en-US" sz="1400" dirty="0"/>
-              <a:t>Investigate airplanes equipped with fail-safes to correct for pilot error</a:t>
+              <a:t>Investigate airplanes equipped with extra safety features</a:t>
             </a:r>
             <a:endParaRPr lang="en-US" dirty="0"/>
           </a:p>
@@ -10965,7 +10981,7 @@
             </a:pPr>
             <a:r>
               <a:rPr lang="en-US" sz="2400" dirty="0"/>
-              <a:t>Selected top 10 major companies</a:t>
+              <a:t>Top 10 companies</a:t>
             </a:r>
           </a:p>
           <a:p>
@@ -11029,7 +11045,7 @@
 </file>
 
 <file path=ppt/slides/slide6.xml><?xml version="1.0" encoding="utf-8"?>
-<p:sld xmlns:a="http://schemas.openxmlformats.org/drawingml/2006/main" xmlns:r="http://schemas.openxmlformats.org/officeDocument/2006/relationships" xmlns:p="http://schemas.openxmlformats.org/presentationml/2006/main">
+<p:sld xmlns:a="http://schemas.openxmlformats.org/drawingml/2006/main" xmlns:r="http://schemas.openxmlformats.org/officeDocument/2006/relationships" xmlns:p="http://schemas.openxmlformats.org/presentationml/2006/main" show="0">
   <p:cSld>
     <p:spTree>
       <p:nvGrpSpPr>
@@ -11276,8 +11292,8 @@
         </p:nvSpPr>
         <p:spPr>
           <a:xfrm>
-            <a:off x="838200" y="365125"/>
-            <a:ext cx="10515600" cy="1325563"/>
+            <a:off x="838200" y="31434"/>
+            <a:ext cx="10515600" cy="549275"/>
           </a:xfrm>
         </p:spPr>
         <p:txBody>
@@ -11286,15 +11302,8 @@
           <a:p>
             <a:r>
               <a:rPr lang="en-US" dirty="0"/>
-              <a:t>Actual Results </a:t>
-            </a:r>
-            <a:r>
-              <a:rPr lang="en-US" dirty="0">
-                <a:sym typeface="Wingdings" panose="05000000000000000000" pitchFamily="2" charset="2"/>
-              </a:rPr>
-              <a:t></a:t>
-            </a:r>
-            <a:endParaRPr lang="en-US" dirty="0"/>
+              <a:t>Accidents vs. Uninjured per Make</a:t>
+            </a:r>
           </a:p>
         </p:txBody>
       </p:sp>
@@ -11333,81 +11342,12 @@
           </a:p>
         </p:txBody>
       </p:sp>
-      <p:sp>
-        <p:nvSpPr>
-          <p:cNvPr id="9" name="TextBox 8">
-            <a:extLst>
-              <a:ext uri="{FF2B5EF4-FFF2-40B4-BE49-F238E27FC236}">
-                <a16:creationId xmlns:a16="http://schemas.microsoft.com/office/drawing/2014/main" id="{E1759824-5F1C-926B-AFBF-ECF8E36A19F2}"/>
-              </a:ext>
-            </a:extLst>
-          </p:cNvPr>
-          <p:cNvSpPr txBox="1"/>
-          <p:nvPr/>
-        </p:nvSpPr>
-        <p:spPr>
-          <a:xfrm>
-            <a:off x="636103" y="2770910"/>
-            <a:ext cx="4834393" cy="1200329"/>
-          </a:xfrm>
-          <a:prstGeom prst="rect">
-            <a:avLst/>
-          </a:prstGeom>
-          <a:noFill/>
-        </p:spPr>
-        <p:txBody>
-          <a:bodyPr wrap="square" rtlCol="0">
-            <a:spAutoFit/>
-          </a:bodyPr>
-          <a:lstStyle/>
-          <a:p>
-            <a:pPr marL="285750" indent="-285750">
-              <a:buFont typeface="Arial" panose="020B0604020202020204" pitchFamily="34" charset="0"/>
-              <a:buChar char="•"/>
-            </a:pPr>
-            <a:r>
-              <a:rPr lang="en-US" dirty="0"/>
-              <a:t>Uninjured vs. Accidents per Make</a:t>
-            </a:r>
-          </a:p>
-          <a:p>
-            <a:pPr marL="285750" indent="-285750">
-              <a:buFont typeface="Arial" panose="020B0604020202020204" pitchFamily="34" charset="0"/>
-              <a:buChar char="•"/>
-            </a:pPr>
-            <a:r>
-              <a:rPr lang="en-US" dirty="0"/>
-              <a:t>Cessna – 47%</a:t>
-            </a:r>
-          </a:p>
-          <a:p>
-            <a:pPr marL="285750" indent="-285750">
-              <a:buFont typeface="Arial" panose="020B0604020202020204" pitchFamily="34" charset="0"/>
-              <a:buChar char="•"/>
-            </a:pPr>
-            <a:r>
-              <a:rPr lang="en-US" dirty="0"/>
-              <a:t>Piper – 26%</a:t>
-            </a:r>
-          </a:p>
-          <a:p>
-            <a:pPr marL="285750" indent="-285750">
-              <a:buFont typeface="Arial" panose="020B0604020202020204" pitchFamily="34" charset="0"/>
-              <a:buChar char="•"/>
-            </a:pPr>
-            <a:r>
-              <a:rPr lang="en-US" dirty="0"/>
-              <a:t>Boeing – 8%</a:t>
-            </a:r>
-          </a:p>
-        </p:txBody>
-      </p:sp>
       <p:pic>
         <p:nvPicPr>
-          <p:cNvPr id="13" name="Picture 12" descr="A diagram of different colored circles&#10;&#10;Description automatically generated">
-            <a:extLst>
-              <a:ext uri="{FF2B5EF4-FFF2-40B4-BE49-F238E27FC236}">
-                <a16:creationId xmlns:a16="http://schemas.microsoft.com/office/drawing/2014/main" id="{47DD1706-80C7-5B0E-B119-6CBDD4886B98}"/>
+          <p:cNvPr id="4" name="Picture 3" descr="Diagram showing Accidents vs. Uninjured per Make">
+            <a:extLst>
+              <a:ext uri="{FF2B5EF4-FFF2-40B4-BE49-F238E27FC236}">
+                <a16:creationId xmlns:a16="http://schemas.microsoft.com/office/drawing/2014/main" id="{016A9887-C237-2739-B56E-57FFC9D5A628}"/>
               </a:ext>
             </a:extLst>
           </p:cNvPr>
@@ -11424,8 +11364,8 @@
         </p:blipFill>
         <p:spPr>
           <a:xfrm>
-            <a:off x="6721505" y="1382953"/>
-            <a:ext cx="5184427" cy="3976245"/>
+            <a:off x="2257227" y="580709"/>
+            <a:ext cx="7677545" cy="6140766"/>
           </a:xfrm>
           <a:prstGeom prst="rect">
             <a:avLst/>
@@ -11480,17 +11420,19 @@
         </p:nvSpPr>
         <p:spPr>
           <a:xfrm>
-            <a:off x="5246867" y="356977"/>
-            <a:ext cx="1698266" cy="585788"/>
-          </a:xfrm>
-        </p:spPr>
-        <p:txBody>
-          <a:bodyPr/>
+            <a:off x="2419546" y="312450"/>
+            <a:ext cx="7352908" cy="585788"/>
+          </a:xfrm>
+        </p:spPr>
+        <p:txBody>
+          <a:bodyPr>
+            <a:normAutofit fontScale="90000"/>
+          </a:bodyPr>
           <a:lstStyle/>
           <a:p>
             <a:r>
               <a:rPr lang="en-US" dirty="0"/>
-              <a:t>Results</a:t>
+              <a:t>Purpose of flight vs. Average Uninjured</a:t>
             </a:r>
           </a:p>
         </p:txBody>
@@ -11530,12 +11472,47 @@
           </a:p>
         </p:txBody>
       </p:sp>
+      <p:sp>
+        <p:nvSpPr>
+          <p:cNvPr id="32" name="TextBox 31">
+            <a:extLst>
+              <a:ext uri="{FF2B5EF4-FFF2-40B4-BE49-F238E27FC236}">
+                <a16:creationId xmlns:a16="http://schemas.microsoft.com/office/drawing/2014/main" id="{D9383D59-DCF4-5CE5-ABFF-F12B8A5D57D3}"/>
+              </a:ext>
+            </a:extLst>
+          </p:cNvPr>
+          <p:cNvSpPr txBox="1"/>
+          <p:nvPr/>
+        </p:nvSpPr>
+        <p:spPr>
+          <a:xfrm>
+            <a:off x="7729978" y="3105834"/>
+            <a:ext cx="4199067" cy="923330"/>
+          </a:xfrm>
+          <a:prstGeom prst="rect">
+            <a:avLst/>
+          </a:prstGeom>
+          <a:noFill/>
+        </p:spPr>
+        <p:txBody>
+          <a:bodyPr wrap="square" rtlCol="0">
+            <a:spAutoFit/>
+          </a:bodyPr>
+          <a:lstStyle/>
+          <a:p>
+            <a:r>
+              <a:rPr lang="en-US" dirty="0"/>
+              <a:t>Personal flights have a relatively low average of uninjured passengers when involved in an accident</a:t>
+            </a:r>
+          </a:p>
+        </p:txBody>
+      </p:sp>
       <p:pic>
         <p:nvPicPr>
-          <p:cNvPr id="30" name="Picture 29">
-            <a:extLst>
-              <a:ext uri="{FF2B5EF4-FFF2-40B4-BE49-F238E27FC236}">
-                <a16:creationId xmlns:a16="http://schemas.microsoft.com/office/drawing/2014/main" id="{8FE5652C-EC4B-2C2D-3E23-D88907916C10}"/>
+          <p:cNvPr id="6" name="Picture 5" descr="A graph of a bar graph&#10;&#10;Description automatically generated with medium confidence">
+            <a:extLst>
+              <a:ext uri="{FF2B5EF4-FFF2-40B4-BE49-F238E27FC236}">
+                <a16:creationId xmlns:a16="http://schemas.microsoft.com/office/drawing/2014/main" id="{D4657AE6-6A40-ABFE-A49F-0A985EC9566B}"/>
               </a:ext>
             </a:extLst>
           </p:cNvPr>
@@ -11552,53 +11529,14 @@
         </p:blipFill>
         <p:spPr>
           <a:xfrm>
-            <a:off x="737983" y="935103"/>
-            <a:ext cx="10795555" cy="3333921"/>
+            <a:off x="270824" y="1786746"/>
+            <a:ext cx="7110076" cy="3284505"/>
           </a:xfrm>
           <a:prstGeom prst="rect">
             <a:avLst/>
           </a:prstGeom>
         </p:spPr>
       </p:pic>
-      <p:sp>
-        <p:nvSpPr>
-          <p:cNvPr id="32" name="TextBox 31">
-            <a:extLst>
-              <a:ext uri="{FF2B5EF4-FFF2-40B4-BE49-F238E27FC236}">
-                <a16:creationId xmlns:a16="http://schemas.microsoft.com/office/drawing/2014/main" id="{D9383D59-DCF4-5CE5-ABFF-F12B8A5D57D3}"/>
-              </a:ext>
-            </a:extLst>
-          </p:cNvPr>
-          <p:cNvSpPr txBox="1"/>
-          <p:nvPr/>
-        </p:nvSpPr>
-        <p:spPr>
-          <a:xfrm>
-            <a:off x="548640" y="5295239"/>
-            <a:ext cx="4548146" cy="646331"/>
-          </a:xfrm>
-          <a:prstGeom prst="rect">
-            <a:avLst/>
-          </a:prstGeom>
-          <a:noFill/>
-        </p:spPr>
-        <p:txBody>
-          <a:bodyPr wrap="square" rtlCol="0">
-            <a:spAutoFit/>
-          </a:bodyPr>
-          <a:lstStyle/>
-          <a:p>
-            <a:pPr marL="285750" indent="-285750">
-              <a:buFont typeface="Arial" panose="020B0604020202020204" pitchFamily="34" charset="0"/>
-              <a:buChar char="•"/>
-            </a:pPr>
-            <a:r>
-              <a:rPr lang="en-US" dirty="0"/>
-              <a:t>Personal flights have highest uninjured when involved in an accident</a:t>
-            </a:r>
-          </a:p>
-        </p:txBody>
-      </p:sp>
     </p:spTree>
     <p:extLst>
       <p:ext uri="{BB962C8B-B14F-4D97-AF65-F5344CB8AC3E}">
@@ -11647,8 +11585,8 @@
         </p:nvSpPr>
         <p:spPr>
           <a:xfrm>
-            <a:off x="4319784" y="391244"/>
-            <a:ext cx="2854518" cy="1325563"/>
+            <a:off x="3028643" y="469132"/>
+            <a:ext cx="6134714" cy="782833"/>
           </a:xfrm>
         </p:spPr>
         <p:txBody>
@@ -11657,7 +11595,7 @@
           <a:p>
             <a:r>
               <a:rPr lang="en-US" dirty="0"/>
-              <a:t>More Results</a:t>
+              <a:t>Fatalities vs. Phase of Flight</a:t>
             </a:r>
           </a:p>
         </p:txBody>
@@ -11680,8 +11618,8 @@
         </p:nvSpPr>
         <p:spPr>
           <a:xfrm>
-            <a:off x="1502170" y="2831566"/>
-            <a:ext cx="3924300" cy="1637067"/>
+            <a:off x="1931687" y="2766218"/>
+            <a:ext cx="2683331" cy="1325563"/>
           </a:xfrm>
         </p:spPr>
         <p:txBody>
@@ -11692,19 +11630,13 @@
           <a:p>
             <a:r>
               <a:rPr lang="en-US" dirty="0"/>
-              <a:t>Fatalities vs. Phase of Flight</a:t>
+              <a:t>Cruise, Approach, &amp; Takeoff have highest injury rate</a:t>
             </a:r>
           </a:p>
           <a:p>
             <a:r>
               <a:rPr lang="en-US" dirty="0"/>
-              <a:t>Cruise, Approach, &amp; Takeoff have highest injury rate</a:t>
-            </a:r>
-          </a:p>
-          <a:p>
-            <a:r>
-              <a:rPr lang="en-US" dirty="0"/>
-              <a:t>Gives insight on additional training &amp; safety measures at high-risk points of the flight</a:t>
+              <a:t>Insight on additional training &amp; safety measures at high-risk points of the flight</a:t>
             </a:r>
           </a:p>
         </p:txBody>
@@ -11746,10 +11678,10 @@
       </p:sp>
       <p:pic>
         <p:nvPicPr>
-          <p:cNvPr id="18" name="Picture 17" descr="A graph with multiple colored bars&#10;&#10;Description automatically generated">
-            <a:extLst>
-              <a:ext uri="{FF2B5EF4-FFF2-40B4-BE49-F238E27FC236}">
-                <a16:creationId xmlns:a16="http://schemas.microsoft.com/office/drawing/2014/main" id="{9A14FBC7-47B0-9680-6014-A1151D54EBD1}"/>
+          <p:cNvPr id="7" name="Picture 6">
+            <a:extLst>
+              <a:ext uri="{FF2B5EF4-FFF2-40B4-BE49-F238E27FC236}">
+                <a16:creationId xmlns:a16="http://schemas.microsoft.com/office/drawing/2014/main" id="{D5AF37D3-8F8B-749D-8D2D-64BECEA76D06}"/>
               </a:ext>
             </a:extLst>
           </p:cNvPr>
@@ -11766,8 +11698,8 @@
         </p:blipFill>
         <p:spPr>
           <a:xfrm>
-            <a:off x="5747043" y="2180307"/>
-            <a:ext cx="6134714" cy="2497384"/>
+            <a:off x="4949072" y="1251965"/>
+            <a:ext cx="6709591" cy="5104385"/>
           </a:xfrm>
           <a:prstGeom prst="rect">
             <a:avLst/>
@@ -12579,15 +12511,6 @@
 </file>
 
 <file path=customXml/item1.xml><?xml version="1.0" encoding="utf-8"?>
-<?mso-contentType ?>
-<FormTemplates xmlns="http://schemas.microsoft.com/sharepoint/v3/contenttype/forms">
-  <Display>DocumentLibraryForm</Display>
-  <Edit>DocumentLibraryForm</Edit>
-  <New>DocumentLibraryForm</New>
-</FormTemplates>
-</file>
-
-<file path=customXml/item2.xml><?xml version="1.0" encoding="utf-8"?>
 <p:properties xmlns:p="http://schemas.microsoft.com/office/2006/metadata/properties" xmlns:xsi="http://www.w3.org/2001/XMLSchema-instance" xmlns:pc="http://schemas.microsoft.com/office/infopath/2007/PartnerControls">
   <documentManagement>
     <_ip_UnifiedCompliancePolicyUIAction xmlns="http://schemas.microsoft.com/sharepoint/v3" xsi:nil="true"/>
@@ -12605,6 +12528,15 @@
     <Background xmlns="71af3243-3dd4-4a8d-8c0d-dd76da1f02a5">false</Background>
   </documentManagement>
 </p:properties>
+</file>
+
+<file path=customXml/item2.xml><?xml version="1.0" encoding="utf-8"?>
+<?mso-contentType ?>
+<FormTemplates xmlns="http://schemas.microsoft.com/sharepoint/v3/contenttype/forms">
+  <Display>DocumentLibraryForm</Display>
+  <Edit>DocumentLibraryForm</Edit>
+  <New>DocumentLibraryForm</New>
+</FormTemplates>
 </file>
 
 <file path=customXml/item3.xml><?xml version="1.0" encoding="utf-8"?>
@@ -12920,14 +12852,6 @@
 </file>
 
 <file path=customXml/itemProps1.xml><?xml version="1.0" encoding="utf-8"?>
-<ds:datastoreItem xmlns:ds="http://schemas.openxmlformats.org/officeDocument/2006/customXml" ds:itemID="{BD5826B4-4DD2-4A9B-8D6D-E91CF9C2316C}">
-  <ds:schemaRefs>
-    <ds:schemaRef ds:uri="http://schemas.microsoft.com/sharepoint/v3/contenttype/forms"/>
-  </ds:schemaRefs>
-</ds:datastoreItem>
-</file>
-
-<file path=customXml/itemProps2.xml><?xml version="1.0" encoding="utf-8"?>
 <ds:datastoreItem xmlns:ds="http://schemas.openxmlformats.org/officeDocument/2006/customXml" ds:itemID="{4CC7F809-A434-4A8D-A127-1C50C2DB3890}">
   <ds:schemaRefs>
     <ds:schemaRef ds:uri="http://schemas.microsoft.com/office/2006/metadata/properties"/>
@@ -12935,6 +12859,14 @@
     <ds:schemaRef ds:uri="http://schemas.microsoft.com/sharepoint/v3"/>
     <ds:schemaRef ds:uri="71af3243-3dd4-4a8d-8c0d-dd76da1f02a5"/>
     <ds:schemaRef ds:uri="230e9df3-be65-4c73-a93b-d1236ebd677e"/>
+  </ds:schemaRefs>
+</ds:datastoreItem>
+</file>
+
+<file path=customXml/itemProps2.xml><?xml version="1.0" encoding="utf-8"?>
+<ds:datastoreItem xmlns:ds="http://schemas.openxmlformats.org/officeDocument/2006/customXml" ds:itemID="{BD5826B4-4DD2-4A9B-8D6D-E91CF9C2316C}">
+  <ds:schemaRefs>
+    <ds:schemaRef ds:uri="http://schemas.microsoft.com/sharepoint/v3/contenttype/forms"/>
   </ds:schemaRefs>
 </ds:datastoreItem>
 </file>

</xml_diff>

<commit_message>
adding PDS and updates
</commit_message>
<xml_diff>
--- a/Charting_New_Heights.pptx
+++ b/Charting_New_Heights.pptx
@@ -5,10 +5,10 @@
     <p:sldMasterId id="2147483648" r:id="rId4"/>
   </p:sldMasterIdLst>
   <p:notesMasterIdLst>
-    <p:notesMasterId r:id="rId17"/>
+    <p:notesMasterId r:id="rId16"/>
   </p:notesMasterIdLst>
   <p:handoutMasterIdLst>
-    <p:handoutMasterId r:id="rId18"/>
+    <p:handoutMasterId r:id="rId17"/>
   </p:handoutMasterIdLst>
   <p:sldIdLst>
     <p:sldId id="256" r:id="rId5"/>
@@ -16,13 +16,12 @@
     <p:sldId id="258" r:id="rId7"/>
     <p:sldId id="262" r:id="rId8"/>
     <p:sldId id="265" r:id="rId9"/>
-    <p:sldId id="264" r:id="rId10"/>
-    <p:sldId id="270" r:id="rId11"/>
-    <p:sldId id="259" r:id="rId12"/>
-    <p:sldId id="260" r:id="rId13"/>
-    <p:sldId id="263" r:id="rId14"/>
-    <p:sldId id="261" r:id="rId15"/>
-    <p:sldId id="271" r:id="rId16"/>
+    <p:sldId id="270" r:id="rId10"/>
+    <p:sldId id="259" r:id="rId11"/>
+    <p:sldId id="260" r:id="rId12"/>
+    <p:sldId id="263" r:id="rId13"/>
+    <p:sldId id="261" r:id="rId14"/>
+    <p:sldId id="271" r:id="rId15"/>
   </p:sldIdLst>
   <p:sldSz cx="12192000" cy="6858000"/>
   <p:notesSz cx="6858000" cy="9144000"/>
@@ -9643,7 +9642,7 @@
           <p:cNvPr id="2" name="Title 1">
             <a:extLst>
               <a:ext uri="{FF2B5EF4-FFF2-40B4-BE49-F238E27FC236}">
-                <a16:creationId xmlns:a16="http://schemas.microsoft.com/office/drawing/2014/main" id="{42DD0E59-4C68-4F87-9821-23C69713D980}"/>
+                <a16:creationId xmlns:a16="http://schemas.microsoft.com/office/drawing/2014/main" id="{C4CA0637-CCAA-425E-A57A-6205AFDC8B8C}"/>
               </a:ext>
             </a:extLst>
           </p:cNvPr>
@@ -9656,8 +9655,8 @@
         </p:nvSpPr>
         <p:spPr>
           <a:xfrm>
-            <a:off x="4222142" y="399196"/>
-            <a:ext cx="3458818" cy="888915"/>
+            <a:off x="1885156" y="892177"/>
+            <a:ext cx="8421688" cy="1325563"/>
           </a:xfrm>
         </p:spPr>
         <p:txBody>
@@ -9666,17 +9665,250 @@
           <a:p>
             <a:r>
               <a:rPr lang="en-US" dirty="0"/>
-              <a:t>Conclusions</a:t>
-            </a:r>
-          </a:p>
-        </p:txBody>
-      </p:sp>
-      <p:sp>
-        <p:nvSpPr>
-          <p:cNvPr id="58" name="Slide Number Placeholder 57">
-            <a:extLst>
-              <a:ext uri="{FF2B5EF4-FFF2-40B4-BE49-F238E27FC236}">
-                <a16:creationId xmlns:a16="http://schemas.microsoft.com/office/drawing/2014/main" id="{E1900601-8B04-4FF3-B06F-6BEFAC6556D3}"/>
+              <a:t>Next Steps</a:t>
+            </a:r>
+          </a:p>
+        </p:txBody>
+      </p:sp>
+      <p:sp>
+        <p:nvSpPr>
+          <p:cNvPr id="3" name="Text Placeholder 2">
+            <a:extLst>
+              <a:ext uri="{FF2B5EF4-FFF2-40B4-BE49-F238E27FC236}">
+                <a16:creationId xmlns:a16="http://schemas.microsoft.com/office/drawing/2014/main" id="{D851C395-6BC4-4F00-B40B-069DBBB7C08B}"/>
+              </a:ext>
+            </a:extLst>
+          </p:cNvPr>
+          <p:cNvSpPr>
+            <a:spLocks noGrp="1"/>
+          </p:cNvSpPr>
+          <p:nvPr>
+            <p:ph type="body" idx="1"/>
+          </p:nvPr>
+        </p:nvSpPr>
+        <p:spPr>
+          <a:xfrm>
+            <a:off x="1243104" y="2776936"/>
+            <a:ext cx="2882475" cy="823912"/>
+          </a:xfrm>
+        </p:spPr>
+        <p:txBody>
+          <a:bodyPr/>
+          <a:lstStyle/>
+          <a:p>
+            <a:r>
+              <a:rPr lang="en-US" dirty="0"/>
+              <a:t>ROI</a:t>
+            </a:r>
+          </a:p>
+        </p:txBody>
+      </p:sp>
+      <p:sp>
+        <p:nvSpPr>
+          <p:cNvPr id="4" name="Content Placeholder 3">
+            <a:extLst>
+              <a:ext uri="{FF2B5EF4-FFF2-40B4-BE49-F238E27FC236}">
+                <a16:creationId xmlns:a16="http://schemas.microsoft.com/office/drawing/2014/main" id="{A1D16151-9486-4A03-AE3A-F1CC562E0564}"/>
+              </a:ext>
+            </a:extLst>
+          </p:cNvPr>
+          <p:cNvSpPr>
+            <a:spLocks noGrp="1"/>
+          </p:cNvSpPr>
+          <p:nvPr>
+            <p:ph sz="half" idx="2"/>
+          </p:nvPr>
+        </p:nvSpPr>
+        <p:spPr>
+          <a:xfrm>
+            <a:off x="1243104" y="3834607"/>
+            <a:ext cx="2882475" cy="920274"/>
+          </a:xfrm>
+        </p:spPr>
+        <p:txBody>
+          <a:bodyPr>
+            <a:normAutofit lnSpcReduction="10000"/>
+          </a:bodyPr>
+          <a:lstStyle/>
+          <a:p>
+            <a:r>
+              <a:rPr lang="en-US" sz="1400" dirty="0"/>
+              <a:t>Find ROI </a:t>
+            </a:r>
+            <a:r>
+              <a:rPr lang="en-US" dirty="0"/>
+              <a:t>comparing</a:t>
+            </a:r>
+            <a:r>
+              <a:rPr lang="en-US" sz="1400" dirty="0"/>
+              <a:t> smaller &amp; larger airplanes for our company’s entrance into the market</a:t>
+            </a:r>
+          </a:p>
+        </p:txBody>
+      </p:sp>
+      <p:sp>
+        <p:nvSpPr>
+          <p:cNvPr id="5" name="Text Placeholder 4">
+            <a:extLst>
+              <a:ext uri="{FF2B5EF4-FFF2-40B4-BE49-F238E27FC236}">
+                <a16:creationId xmlns:a16="http://schemas.microsoft.com/office/drawing/2014/main" id="{DDE59236-37DD-4582-A2A0-3F9A13A3B55D}"/>
+              </a:ext>
+            </a:extLst>
+          </p:cNvPr>
+          <p:cNvSpPr>
+            <a:spLocks noGrp="1"/>
+          </p:cNvSpPr>
+          <p:nvPr>
+            <p:ph type="body" sz="quarter" idx="3"/>
+          </p:nvPr>
+        </p:nvSpPr>
+        <p:spPr>
+          <a:xfrm>
+            <a:off x="4647665" y="2776936"/>
+            <a:ext cx="2896671" cy="823912"/>
+          </a:xfrm>
+        </p:spPr>
+        <p:txBody>
+          <a:bodyPr/>
+          <a:lstStyle/>
+          <a:p>
+            <a:r>
+              <a:rPr lang="en-US" dirty="0"/>
+              <a:t>Risk Mitigation</a:t>
+            </a:r>
+          </a:p>
+        </p:txBody>
+      </p:sp>
+      <p:sp>
+        <p:nvSpPr>
+          <p:cNvPr id="6" name="Content Placeholder 5">
+            <a:extLst>
+              <a:ext uri="{FF2B5EF4-FFF2-40B4-BE49-F238E27FC236}">
+                <a16:creationId xmlns:a16="http://schemas.microsoft.com/office/drawing/2014/main" id="{DE1CCF0F-F0BB-42D7-B3C2-C29336739F32}"/>
+              </a:ext>
+            </a:extLst>
+          </p:cNvPr>
+          <p:cNvSpPr>
+            <a:spLocks noGrp="1"/>
+          </p:cNvSpPr>
+          <p:nvPr>
+            <p:ph sz="quarter" idx="4"/>
+          </p:nvPr>
+        </p:nvSpPr>
+        <p:spPr>
+          <a:xfrm>
+            <a:off x="4647665" y="3834606"/>
+            <a:ext cx="2896671" cy="1997867"/>
+          </a:xfrm>
+        </p:spPr>
+        <p:txBody>
+          <a:bodyPr>
+            <a:normAutofit/>
+          </a:bodyPr>
+          <a:lstStyle/>
+          <a:p>
+            <a:r>
+              <a:rPr lang="en-US" sz="1400" dirty="0"/>
+              <a:t>Develop extra training programs at high-risk flight phase points</a:t>
+            </a:r>
+          </a:p>
+        </p:txBody>
+      </p:sp>
+      <p:sp>
+        <p:nvSpPr>
+          <p:cNvPr id="7" name="Text Placeholder 6">
+            <a:extLst>
+              <a:ext uri="{FF2B5EF4-FFF2-40B4-BE49-F238E27FC236}">
+                <a16:creationId xmlns:a16="http://schemas.microsoft.com/office/drawing/2014/main" id="{1F939793-2181-4A3D-9C5A-CE676CC83EC0}"/>
+              </a:ext>
+            </a:extLst>
+          </p:cNvPr>
+          <p:cNvSpPr>
+            <a:spLocks noGrp="1"/>
+          </p:cNvSpPr>
+          <p:nvPr>
+            <p:ph type="body" idx="13"/>
+          </p:nvPr>
+        </p:nvSpPr>
+        <p:spPr>
+          <a:xfrm>
+            <a:off x="8066421" y="2776936"/>
+            <a:ext cx="2882475" cy="823912"/>
+          </a:xfrm>
+        </p:spPr>
+        <p:txBody>
+          <a:bodyPr/>
+          <a:lstStyle/>
+          <a:p>
+            <a:r>
+              <a:rPr lang="en-US" dirty="0"/>
+              <a:t>Further Analysis</a:t>
+            </a:r>
+          </a:p>
+        </p:txBody>
+      </p:sp>
+      <p:sp>
+        <p:nvSpPr>
+          <p:cNvPr id="8" name="Content Placeholder 7">
+            <a:extLst>
+              <a:ext uri="{FF2B5EF4-FFF2-40B4-BE49-F238E27FC236}">
+                <a16:creationId xmlns:a16="http://schemas.microsoft.com/office/drawing/2014/main" id="{C9FA0B0D-7B36-4D63-86BD-20E6E1B6A0D8}"/>
+              </a:ext>
+            </a:extLst>
+          </p:cNvPr>
+          <p:cNvSpPr>
+            <a:spLocks noGrp="1"/>
+          </p:cNvSpPr>
+          <p:nvPr>
+            <p:ph sz="half" idx="14"/>
+          </p:nvPr>
+        </p:nvSpPr>
+        <p:spPr>
+          <a:xfrm>
+            <a:off x="8066421" y="3834606"/>
+            <a:ext cx="2882475" cy="1997867"/>
+          </a:xfrm>
+        </p:spPr>
+        <p:txBody>
+          <a:bodyPr>
+            <a:normAutofit/>
+          </a:bodyPr>
+          <a:lstStyle/>
+          <a:p>
+            <a:r>
+              <a:rPr lang="en-US" dirty="0"/>
+              <a:t>C</a:t>
+            </a:r>
+            <a:r>
+              <a:rPr lang="en-US" sz="1400" dirty="0"/>
+              <a:t>ost of repair or replacement</a:t>
+            </a:r>
+          </a:p>
+          <a:p>
+            <a:r>
+              <a:rPr lang="en-US" dirty="0"/>
+              <a:t>O</a:t>
+            </a:r>
+            <a:r>
+              <a:rPr lang="en-US" sz="1400" dirty="0"/>
+              <a:t>ccurrence of accidents &amp; why</a:t>
+            </a:r>
+          </a:p>
+          <a:p>
+            <a:r>
+              <a:rPr lang="en-US" sz="1400" dirty="0"/>
+              <a:t>Investigate airplanes equipped with extra safety features</a:t>
+            </a:r>
+            <a:endParaRPr lang="en-US" dirty="0"/>
+          </a:p>
+        </p:txBody>
+      </p:sp>
+      <p:sp>
+        <p:nvSpPr>
+          <p:cNvPr id="11" name="Slide Number Placeholder 10">
+            <a:extLst>
+              <a:ext uri="{FF2B5EF4-FFF2-40B4-BE49-F238E27FC236}">
+                <a16:creationId xmlns:a16="http://schemas.microsoft.com/office/drawing/2014/main" id="{7AE81C1E-A7C3-40CD-9C11-0C03A2221292}"/>
               </a:ext>
             </a:extLst>
           </p:cNvPr>
@@ -9706,113 +9938,10 @@
           </a:p>
         </p:txBody>
       </p:sp>
-      <p:sp>
-        <p:nvSpPr>
-          <p:cNvPr id="325" name="TextBox 324">
-            <a:extLst>
-              <a:ext uri="{FF2B5EF4-FFF2-40B4-BE49-F238E27FC236}">
-                <a16:creationId xmlns:a16="http://schemas.microsoft.com/office/drawing/2014/main" id="{A42B02C5-FE29-188B-9830-F2636DAA46B5}"/>
-              </a:ext>
-            </a:extLst>
-          </p:cNvPr>
-          <p:cNvSpPr txBox="1"/>
-          <p:nvPr/>
-        </p:nvSpPr>
-        <p:spPr>
-          <a:xfrm>
-            <a:off x="1484242" y="1270215"/>
-            <a:ext cx="5983358" cy="1938992"/>
-          </a:xfrm>
-          <a:prstGeom prst="rect">
-            <a:avLst/>
-          </a:prstGeom>
-          <a:noFill/>
-        </p:spPr>
-        <p:txBody>
-          <a:bodyPr wrap="square" rtlCol="0">
-            <a:spAutoFit/>
-          </a:bodyPr>
-          <a:lstStyle/>
-          <a:p>
-            <a:pPr marL="342900" indent="-342900">
-              <a:buFont typeface="Arial" panose="020B0604020202020204" pitchFamily="34" charset="0"/>
-              <a:buChar char="•"/>
-            </a:pPr>
-            <a:r>
-              <a:rPr lang="en-US" sz="2000" dirty="0"/>
-              <a:t>For smaller airplanes, invest in Cessna or Piper</a:t>
-            </a:r>
-          </a:p>
-          <a:p>
-            <a:pPr marL="342900" indent="-342900">
-              <a:buFont typeface="Arial" panose="020B0604020202020204" pitchFamily="34" charset="0"/>
-              <a:buChar char="•"/>
-            </a:pPr>
-            <a:endParaRPr lang="en-US" sz="2000" dirty="0"/>
-          </a:p>
-          <a:p>
-            <a:pPr marL="342900" indent="-342900">
-              <a:buFont typeface="Arial" panose="020B0604020202020204" pitchFamily="34" charset="0"/>
-              <a:buChar char="•"/>
-            </a:pPr>
-            <a:r>
-              <a:rPr lang="en-US" sz="2000" dirty="0"/>
-              <a:t>For larger airplanes, invest in Boeing</a:t>
-            </a:r>
-          </a:p>
-          <a:p>
-            <a:pPr marL="342900" indent="-342900">
-              <a:buFont typeface="Arial" panose="020B0604020202020204" pitchFamily="34" charset="0"/>
-              <a:buChar char="•"/>
-            </a:pPr>
-            <a:endParaRPr lang="en-US" sz="2000" dirty="0"/>
-          </a:p>
-          <a:p>
-            <a:pPr marL="342900" indent="-342900">
-              <a:buFont typeface="Arial" panose="020B0604020202020204" pitchFamily="34" charset="0"/>
-              <a:buChar char="•"/>
-            </a:pPr>
-            <a:r>
-              <a:rPr lang="en-US" sz="2000" dirty="0"/>
-              <a:t>Focus on extra safety measures during cruise, approach, &amp; takeoff</a:t>
-            </a:r>
-          </a:p>
-        </p:txBody>
-      </p:sp>
-      <p:pic>
-        <p:nvPicPr>
-          <p:cNvPr id="328" name="Picture 327" descr="A group of airplanes flying in the sky&#10;&#10;Description automatically generated">
-            <a:extLst>
-              <a:ext uri="{FF2B5EF4-FFF2-40B4-BE49-F238E27FC236}">
-                <a16:creationId xmlns:a16="http://schemas.microsoft.com/office/drawing/2014/main" id="{DA03C357-BEEF-04FF-AD93-4A8CB4B23F95}"/>
-              </a:ext>
-            </a:extLst>
-          </p:cNvPr>
-          <p:cNvPicPr>
-            <a:picLocks noChangeAspect="1"/>
-          </p:cNvPicPr>
-          <p:nvPr/>
-        </p:nvPicPr>
-        <p:blipFill>
-          <a:blip r:embed="rId2"/>
-          <a:stretch>
-            <a:fillRect/>
-          </a:stretch>
-        </p:blipFill>
-        <p:spPr>
-          <a:xfrm>
-            <a:off x="5394297" y="3429000"/>
-            <a:ext cx="5462546" cy="3072682"/>
-          </a:xfrm>
-          <a:prstGeom prst="rect">
-            <a:avLst/>
-          </a:prstGeom>
-        </p:spPr>
-      </p:pic>
     </p:spTree>
     <p:extLst>
       <p:ext uri="{BB962C8B-B14F-4D97-AF65-F5344CB8AC3E}">
-        <p14:creationId xmlns:p14="http://schemas.microsoft.com/office/powerpoint/2010/main" val="4055079983"/>
+        <p14:creationId xmlns:p14="http://schemas.microsoft.com/office/powerpoint/2010/main" val="1429429409"/>
       </p:ext>
     </p:extLst>
   </p:cSld>
@@ -9844,21 +9973,21 @@
           <p:cNvPr id="2" name="Title 1">
             <a:extLst>
               <a:ext uri="{FF2B5EF4-FFF2-40B4-BE49-F238E27FC236}">
-                <a16:creationId xmlns:a16="http://schemas.microsoft.com/office/drawing/2014/main" id="{C4CA0637-CCAA-425E-A57A-6205AFDC8B8C}"/>
-              </a:ext>
-            </a:extLst>
-          </p:cNvPr>
-          <p:cNvSpPr>
-            <a:spLocks noGrp="1"/>
-          </p:cNvSpPr>
-          <p:nvPr>
-            <p:ph type="title"/>
-          </p:nvPr>
-        </p:nvSpPr>
-        <p:spPr>
-          <a:xfrm>
-            <a:off x="1885156" y="892177"/>
-            <a:ext cx="8421688" cy="1325563"/>
+                <a16:creationId xmlns:a16="http://schemas.microsoft.com/office/drawing/2014/main" id="{8BDF1EDE-5423-435C-B149-87AB1BC22B83}"/>
+              </a:ext>
+            </a:extLst>
+          </p:cNvPr>
+          <p:cNvSpPr>
+            <a:spLocks noGrp="1"/>
+          </p:cNvSpPr>
+          <p:nvPr>
+            <p:ph type="ctrTitle"/>
+          </p:nvPr>
+        </p:nvSpPr>
+        <p:spPr>
+          <a:xfrm>
+            <a:off x="4267200" y="1615736"/>
+            <a:ext cx="4179570" cy="1524735"/>
           </a:xfrm>
         </p:spPr>
         <p:txBody>
@@ -9867,31 +9996,107 @@
           <a:p>
             <a:r>
               <a:rPr lang="en-US" dirty="0"/>
-              <a:t>Next Steps</a:t>
-            </a:r>
-          </a:p>
-        </p:txBody>
-      </p:sp>
-      <p:sp>
-        <p:nvSpPr>
-          <p:cNvPr id="3" name="Text Placeholder 2">
-            <a:extLst>
-              <a:ext uri="{FF2B5EF4-FFF2-40B4-BE49-F238E27FC236}">
-                <a16:creationId xmlns:a16="http://schemas.microsoft.com/office/drawing/2014/main" id="{D851C395-6BC4-4F00-B40B-069DBBB7C08B}"/>
-              </a:ext>
-            </a:extLst>
-          </p:cNvPr>
-          <p:cNvSpPr>
-            <a:spLocks noGrp="1"/>
-          </p:cNvSpPr>
-          <p:nvPr>
-            <p:ph type="body" idx="1"/>
-          </p:nvPr>
-        </p:nvSpPr>
-        <p:spPr>
-          <a:xfrm>
-            <a:off x="1243104" y="2776936"/>
-            <a:ext cx="2882475" cy="823912"/>
+              <a:t>THANK YOU</a:t>
+            </a:r>
+          </a:p>
+        </p:txBody>
+      </p:sp>
+      <p:sp>
+        <p:nvSpPr>
+          <p:cNvPr id="3" name="Subtitle 2">
+            <a:extLst>
+              <a:ext uri="{FF2B5EF4-FFF2-40B4-BE49-F238E27FC236}">
+                <a16:creationId xmlns:a16="http://schemas.microsoft.com/office/drawing/2014/main" id="{AF64C29E-DF30-4DC6-AB95-2016F9A703B6}"/>
+              </a:ext>
+            </a:extLst>
+          </p:cNvPr>
+          <p:cNvSpPr>
+            <a:spLocks noGrp="1"/>
+          </p:cNvSpPr>
+          <p:nvPr>
+            <p:ph type="subTitle" idx="1"/>
+          </p:nvPr>
+        </p:nvSpPr>
+        <p:spPr>
+          <a:xfrm>
+            <a:off x="4267199" y="3238103"/>
+            <a:ext cx="4765483" cy="1874586"/>
+          </a:xfrm>
+        </p:spPr>
+        <p:txBody>
+          <a:bodyPr>
+            <a:normAutofit fontScale="92500" lnSpcReduction="20000"/>
+          </a:bodyPr>
+          <a:lstStyle/>
+          <a:p>
+            <a:r>
+              <a:rPr lang="en-US" dirty="0"/>
+              <a:t>Jacob </a:t>
+            </a:r>
+            <a:r>
+              <a:rPr lang="en-US" dirty="0" err="1"/>
+              <a:t>Ambert</a:t>
+            </a:r>
+            <a:br>
+              <a:rPr lang="en-US" dirty="0"/>
+            </a:br>
+            <a:r>
+              <a:rPr lang="en-US" dirty="0"/>
+              <a:t>(jaambert@gmail.com)</a:t>
+            </a:r>
+          </a:p>
+          <a:p>
+            <a:r>
+              <a:rPr lang="en-US" dirty="0" err="1"/>
+              <a:t>Juvenson</a:t>
+            </a:r>
+            <a:r>
+              <a:rPr lang="en-US" dirty="0"/>
+              <a:t> Edouard</a:t>
+            </a:r>
+            <a:br>
+              <a:rPr lang="en-US" dirty="0"/>
+            </a:br>
+            <a:r>
+              <a:rPr lang="en-US" dirty="0"/>
+              <a:t>(juvensonedouard@gmail.com)</a:t>
+            </a:r>
+          </a:p>
+          <a:p>
+            <a:r>
+              <a:rPr lang="en-US" dirty="0"/>
+              <a:t>Katie Pegg</a:t>
+            </a:r>
+            <a:br>
+              <a:rPr lang="en-US" dirty="0"/>
+            </a:br>
+            <a:r>
+              <a:rPr lang="en-US" dirty="0"/>
+              <a:t>(kpegg916@gmail.com)</a:t>
+            </a:r>
+          </a:p>
+        </p:txBody>
+      </p:sp>
+      <p:sp>
+        <p:nvSpPr>
+          <p:cNvPr id="5" name="Footer Placeholder 4">
+            <a:extLst>
+              <a:ext uri="{FF2B5EF4-FFF2-40B4-BE49-F238E27FC236}">
+                <a16:creationId xmlns:a16="http://schemas.microsoft.com/office/drawing/2014/main" id="{3990FA1B-5022-47AB-A0AE-8F5C5797997C}"/>
+              </a:ext>
+            </a:extLst>
+          </p:cNvPr>
+          <p:cNvSpPr>
+            <a:spLocks noGrp="1"/>
+          </p:cNvSpPr>
+          <p:nvPr>
+            <p:ph type="ftr" sz="quarter" idx="11"/>
+          </p:nvPr>
+        </p:nvSpPr>
+        <p:spPr>
+          <a:xfrm>
+            <a:off x="6479721" y="6356350"/>
+            <a:ext cx="2661557" cy="365125"/>
           </a:xfrm>
         </p:spPr>
         <p:txBody>
@@ -9900,217 +10105,17 @@
           <a:p>
             <a:r>
               <a:rPr lang="en-US" dirty="0"/>
-              <a:t>ROI</a:t>
-            </a:r>
-          </a:p>
-        </p:txBody>
-      </p:sp>
-      <p:sp>
-        <p:nvSpPr>
-          <p:cNvPr id="4" name="Content Placeholder 3">
-            <a:extLst>
-              <a:ext uri="{FF2B5EF4-FFF2-40B4-BE49-F238E27FC236}">
-                <a16:creationId xmlns:a16="http://schemas.microsoft.com/office/drawing/2014/main" id="{A1D16151-9486-4A03-AE3A-F1CC562E0564}"/>
-              </a:ext>
-            </a:extLst>
-          </p:cNvPr>
-          <p:cNvSpPr>
-            <a:spLocks noGrp="1"/>
-          </p:cNvSpPr>
-          <p:nvPr>
-            <p:ph sz="half" idx="2"/>
-          </p:nvPr>
-        </p:nvSpPr>
-        <p:spPr>
-          <a:xfrm>
-            <a:off x="1243104" y="3834607"/>
-            <a:ext cx="2882475" cy="920274"/>
-          </a:xfrm>
-        </p:spPr>
-        <p:txBody>
-          <a:bodyPr>
-            <a:normAutofit lnSpcReduction="10000"/>
-          </a:bodyPr>
-          <a:lstStyle/>
-          <a:p>
-            <a:r>
-              <a:rPr lang="en-US" sz="1400" dirty="0"/>
-              <a:t>Find ROI </a:t>
-            </a:r>
-            <a:r>
-              <a:rPr lang="en-US" dirty="0"/>
-              <a:t>comparing</a:t>
-            </a:r>
-            <a:r>
-              <a:rPr lang="en-US" sz="1400" dirty="0"/>
-              <a:t> smaller &amp; larger airplanes for our company’s entrance into the market</a:t>
-            </a:r>
-          </a:p>
-        </p:txBody>
-      </p:sp>
-      <p:sp>
-        <p:nvSpPr>
-          <p:cNvPr id="5" name="Text Placeholder 4">
-            <a:extLst>
-              <a:ext uri="{FF2B5EF4-FFF2-40B4-BE49-F238E27FC236}">
-                <a16:creationId xmlns:a16="http://schemas.microsoft.com/office/drawing/2014/main" id="{DDE59236-37DD-4582-A2A0-3F9A13A3B55D}"/>
-              </a:ext>
-            </a:extLst>
-          </p:cNvPr>
-          <p:cNvSpPr>
-            <a:spLocks noGrp="1"/>
-          </p:cNvSpPr>
-          <p:nvPr>
-            <p:ph type="body" sz="quarter" idx="3"/>
-          </p:nvPr>
-        </p:nvSpPr>
-        <p:spPr>
-          <a:xfrm>
-            <a:off x="4647665" y="2776936"/>
-            <a:ext cx="2896671" cy="823912"/>
-          </a:xfrm>
-        </p:spPr>
-        <p:txBody>
-          <a:bodyPr/>
-          <a:lstStyle/>
-          <a:p>
-            <a:r>
-              <a:rPr lang="en-US" dirty="0"/>
-              <a:t>Risk Mitigation</a:t>
-            </a:r>
-          </a:p>
-        </p:txBody>
-      </p:sp>
-      <p:sp>
-        <p:nvSpPr>
-          <p:cNvPr id="6" name="Content Placeholder 5">
-            <a:extLst>
-              <a:ext uri="{FF2B5EF4-FFF2-40B4-BE49-F238E27FC236}">
-                <a16:creationId xmlns:a16="http://schemas.microsoft.com/office/drawing/2014/main" id="{DE1CCF0F-F0BB-42D7-B3C2-C29336739F32}"/>
-              </a:ext>
-            </a:extLst>
-          </p:cNvPr>
-          <p:cNvSpPr>
-            <a:spLocks noGrp="1"/>
-          </p:cNvSpPr>
-          <p:nvPr>
-            <p:ph sz="quarter" idx="4"/>
-          </p:nvPr>
-        </p:nvSpPr>
-        <p:spPr>
-          <a:xfrm>
-            <a:off x="4647665" y="3834606"/>
-            <a:ext cx="2896671" cy="1997867"/>
-          </a:xfrm>
-        </p:spPr>
-        <p:txBody>
-          <a:bodyPr>
-            <a:normAutofit/>
-          </a:bodyPr>
-          <a:lstStyle/>
-          <a:p>
-            <a:r>
-              <a:rPr lang="en-US" sz="1400" dirty="0"/>
-              <a:t>Develop extra training programs at high-risk flight phase points</a:t>
-            </a:r>
-          </a:p>
-        </p:txBody>
-      </p:sp>
-      <p:sp>
-        <p:nvSpPr>
-          <p:cNvPr id="7" name="Text Placeholder 6">
-            <a:extLst>
-              <a:ext uri="{FF2B5EF4-FFF2-40B4-BE49-F238E27FC236}">
-                <a16:creationId xmlns:a16="http://schemas.microsoft.com/office/drawing/2014/main" id="{1F939793-2181-4A3D-9C5A-CE676CC83EC0}"/>
-              </a:ext>
-            </a:extLst>
-          </p:cNvPr>
-          <p:cNvSpPr>
-            <a:spLocks noGrp="1"/>
-          </p:cNvSpPr>
-          <p:nvPr>
-            <p:ph type="body" idx="13"/>
-          </p:nvPr>
-        </p:nvSpPr>
-        <p:spPr>
-          <a:xfrm>
-            <a:off x="8066421" y="2776936"/>
-            <a:ext cx="2882475" cy="823912"/>
-          </a:xfrm>
-        </p:spPr>
-        <p:txBody>
-          <a:bodyPr/>
-          <a:lstStyle/>
-          <a:p>
-            <a:r>
-              <a:rPr lang="en-US" dirty="0"/>
-              <a:t>Further Analysis</a:t>
-            </a:r>
-          </a:p>
-        </p:txBody>
-      </p:sp>
-      <p:sp>
-        <p:nvSpPr>
-          <p:cNvPr id="8" name="Content Placeholder 7">
-            <a:extLst>
-              <a:ext uri="{FF2B5EF4-FFF2-40B4-BE49-F238E27FC236}">
-                <a16:creationId xmlns:a16="http://schemas.microsoft.com/office/drawing/2014/main" id="{C9FA0B0D-7B36-4D63-86BD-20E6E1B6A0D8}"/>
-              </a:ext>
-            </a:extLst>
-          </p:cNvPr>
-          <p:cNvSpPr>
-            <a:spLocks noGrp="1"/>
-          </p:cNvSpPr>
-          <p:nvPr>
-            <p:ph sz="half" idx="14"/>
-          </p:nvPr>
-        </p:nvSpPr>
-        <p:spPr>
-          <a:xfrm>
-            <a:off x="8066421" y="3834606"/>
-            <a:ext cx="2882475" cy="1997867"/>
-          </a:xfrm>
-        </p:spPr>
-        <p:txBody>
-          <a:bodyPr>
-            <a:normAutofit/>
-          </a:bodyPr>
-          <a:lstStyle/>
-          <a:p>
-            <a:r>
-              <a:rPr lang="en-US" dirty="0"/>
-              <a:t>C</a:t>
-            </a:r>
-            <a:r>
-              <a:rPr lang="en-US" sz="1400" dirty="0"/>
-              <a:t>ost of repair or replacement</a:t>
-            </a:r>
-          </a:p>
-          <a:p>
-            <a:r>
-              <a:rPr lang="en-US" dirty="0"/>
-              <a:t>O</a:t>
-            </a:r>
-            <a:r>
-              <a:rPr lang="en-US" sz="1400" dirty="0"/>
-              <a:t>ccurrence of accidents &amp; why</a:t>
-            </a:r>
-          </a:p>
-          <a:p>
-            <a:r>
-              <a:rPr lang="en-US" sz="1400" dirty="0"/>
-              <a:t>Investigate airplanes equipped with extra safety features</a:t>
-            </a:r>
-            <a:endParaRPr lang="en-US" dirty="0"/>
-          </a:p>
-        </p:txBody>
-      </p:sp>
-      <p:sp>
-        <p:nvSpPr>
-          <p:cNvPr id="11" name="Slide Number Placeholder 10">
-            <a:extLst>
-              <a:ext uri="{FF2B5EF4-FFF2-40B4-BE49-F238E27FC236}">
-                <a16:creationId xmlns:a16="http://schemas.microsoft.com/office/drawing/2014/main" id="{7AE81C1E-A7C3-40CD-9C11-0C03A2221292}"/>
+              <a:t>PRESENTATION TITLE</a:t>
+            </a:r>
+          </a:p>
+        </p:txBody>
+      </p:sp>
+      <p:sp>
+        <p:nvSpPr>
+          <p:cNvPr id="6" name="Slide Number Placeholder 5">
+            <a:extLst>
+              <a:ext uri="{FF2B5EF4-FFF2-40B4-BE49-F238E27FC236}">
+                <a16:creationId xmlns:a16="http://schemas.microsoft.com/office/drawing/2014/main" id="{4C127D99-645F-4FCF-9573-FDFE2A344FA9}"/>
               </a:ext>
             </a:extLst>
           </p:cNvPr>
@@ -10123,8 +10128,8 @@
         </p:nvSpPr>
         <p:spPr>
           <a:xfrm>
-            <a:off x="8610600" y="6356350"/>
-            <a:ext cx="2743200" cy="365125"/>
+            <a:off x="9579428" y="6356350"/>
+            <a:ext cx="1774371" cy="365125"/>
           </a:xfrm>
         </p:spPr>
         <p:txBody>
@@ -10135,213 +10140,6 @@
               <a:rPr lang="en-US" smtClean="0"/>
               <a:pPr/>
               <a:t>11</a:t>
-            </a:fld>
-            <a:endParaRPr lang="en-US" dirty="0"/>
-          </a:p>
-        </p:txBody>
-      </p:sp>
-    </p:spTree>
-    <p:extLst>
-      <p:ext uri="{BB962C8B-B14F-4D97-AF65-F5344CB8AC3E}">
-        <p14:creationId xmlns:p14="http://schemas.microsoft.com/office/powerpoint/2010/main" val="1429429409"/>
-      </p:ext>
-    </p:extLst>
-  </p:cSld>
-  <p:clrMapOvr>
-    <a:masterClrMapping/>
-  </p:clrMapOvr>
-</p:sld>
-</file>
-
-<file path=ppt/slides/slide12.xml><?xml version="1.0" encoding="utf-8"?>
-<p:sld xmlns:a="http://schemas.openxmlformats.org/drawingml/2006/main" xmlns:r="http://schemas.openxmlformats.org/officeDocument/2006/relationships" xmlns:p="http://schemas.openxmlformats.org/presentationml/2006/main">
-  <p:cSld>
-    <p:spTree>
-      <p:nvGrpSpPr>
-        <p:cNvPr id="1" name=""/>
-        <p:cNvGrpSpPr/>
-        <p:nvPr/>
-      </p:nvGrpSpPr>
-      <p:grpSpPr>
-        <a:xfrm>
-          <a:off x="0" y="0"/>
-          <a:ext cx="0" cy="0"/>
-          <a:chOff x="0" y="0"/>
-          <a:chExt cx="0" cy="0"/>
-        </a:xfrm>
-      </p:grpSpPr>
-      <p:sp>
-        <p:nvSpPr>
-          <p:cNvPr id="2" name="Title 1">
-            <a:extLst>
-              <a:ext uri="{FF2B5EF4-FFF2-40B4-BE49-F238E27FC236}">
-                <a16:creationId xmlns:a16="http://schemas.microsoft.com/office/drawing/2014/main" id="{8BDF1EDE-5423-435C-B149-87AB1BC22B83}"/>
-              </a:ext>
-            </a:extLst>
-          </p:cNvPr>
-          <p:cNvSpPr>
-            <a:spLocks noGrp="1"/>
-          </p:cNvSpPr>
-          <p:nvPr>
-            <p:ph type="ctrTitle"/>
-          </p:nvPr>
-        </p:nvSpPr>
-        <p:spPr>
-          <a:xfrm>
-            <a:off x="4267200" y="1615736"/>
-            <a:ext cx="4179570" cy="1524735"/>
-          </a:xfrm>
-        </p:spPr>
-        <p:txBody>
-          <a:bodyPr/>
-          <a:lstStyle/>
-          <a:p>
-            <a:r>
-              <a:rPr lang="en-US" dirty="0"/>
-              <a:t>THANK YOU</a:t>
-            </a:r>
-          </a:p>
-        </p:txBody>
-      </p:sp>
-      <p:sp>
-        <p:nvSpPr>
-          <p:cNvPr id="3" name="Subtitle 2">
-            <a:extLst>
-              <a:ext uri="{FF2B5EF4-FFF2-40B4-BE49-F238E27FC236}">
-                <a16:creationId xmlns:a16="http://schemas.microsoft.com/office/drawing/2014/main" id="{AF64C29E-DF30-4DC6-AB95-2016F9A703B6}"/>
-              </a:ext>
-            </a:extLst>
-          </p:cNvPr>
-          <p:cNvSpPr>
-            <a:spLocks noGrp="1"/>
-          </p:cNvSpPr>
-          <p:nvPr>
-            <p:ph type="subTitle" idx="1"/>
-          </p:nvPr>
-        </p:nvSpPr>
-        <p:spPr>
-          <a:xfrm>
-            <a:off x="4267199" y="3238103"/>
-            <a:ext cx="4765483" cy="1874586"/>
-          </a:xfrm>
-        </p:spPr>
-        <p:txBody>
-          <a:bodyPr>
-            <a:normAutofit fontScale="92500" lnSpcReduction="20000"/>
-          </a:bodyPr>
-          <a:lstStyle/>
-          <a:p>
-            <a:r>
-              <a:rPr lang="en-US" dirty="0"/>
-              <a:t>Jacob </a:t>
-            </a:r>
-            <a:r>
-              <a:rPr lang="en-US" dirty="0" err="1"/>
-              <a:t>Ambert</a:t>
-            </a:r>
-            <a:br>
-              <a:rPr lang="en-US" dirty="0"/>
-            </a:br>
-            <a:r>
-              <a:rPr lang="en-US" dirty="0"/>
-              <a:t>(jaambert@gmail.com)</a:t>
-            </a:r>
-          </a:p>
-          <a:p>
-            <a:r>
-              <a:rPr lang="en-US" dirty="0" err="1"/>
-              <a:t>Juvenson</a:t>
-            </a:r>
-            <a:r>
-              <a:rPr lang="en-US" dirty="0"/>
-              <a:t> Edouard</a:t>
-            </a:r>
-            <a:br>
-              <a:rPr lang="en-US" dirty="0"/>
-            </a:br>
-            <a:r>
-              <a:rPr lang="en-US" dirty="0"/>
-              <a:t>(juvensonedouard@gmail.com)</a:t>
-            </a:r>
-          </a:p>
-          <a:p>
-            <a:r>
-              <a:rPr lang="en-US" dirty="0"/>
-              <a:t>Katie Pegg</a:t>
-            </a:r>
-            <a:br>
-              <a:rPr lang="en-US" dirty="0"/>
-            </a:br>
-            <a:r>
-              <a:rPr lang="en-US" dirty="0"/>
-              <a:t>(kpegg916@gmail.com)</a:t>
-            </a:r>
-          </a:p>
-        </p:txBody>
-      </p:sp>
-      <p:sp>
-        <p:nvSpPr>
-          <p:cNvPr id="5" name="Footer Placeholder 4">
-            <a:extLst>
-              <a:ext uri="{FF2B5EF4-FFF2-40B4-BE49-F238E27FC236}">
-                <a16:creationId xmlns:a16="http://schemas.microsoft.com/office/drawing/2014/main" id="{3990FA1B-5022-47AB-A0AE-8F5C5797997C}"/>
-              </a:ext>
-            </a:extLst>
-          </p:cNvPr>
-          <p:cNvSpPr>
-            <a:spLocks noGrp="1"/>
-          </p:cNvSpPr>
-          <p:nvPr>
-            <p:ph type="ftr" sz="quarter" idx="11"/>
-          </p:nvPr>
-        </p:nvSpPr>
-        <p:spPr>
-          <a:xfrm>
-            <a:off x="6479721" y="6356350"/>
-            <a:ext cx="2661557" cy="365125"/>
-          </a:xfrm>
-        </p:spPr>
-        <p:txBody>
-          <a:bodyPr/>
-          <a:lstStyle/>
-          <a:p>
-            <a:r>
-              <a:rPr lang="en-US" dirty="0"/>
-              <a:t>PRESENTATION TITLE</a:t>
-            </a:r>
-          </a:p>
-        </p:txBody>
-      </p:sp>
-      <p:sp>
-        <p:nvSpPr>
-          <p:cNvPr id="6" name="Slide Number Placeholder 5">
-            <a:extLst>
-              <a:ext uri="{FF2B5EF4-FFF2-40B4-BE49-F238E27FC236}">
-                <a16:creationId xmlns:a16="http://schemas.microsoft.com/office/drawing/2014/main" id="{4C127D99-645F-4FCF-9573-FDFE2A344FA9}"/>
-              </a:ext>
-            </a:extLst>
-          </p:cNvPr>
-          <p:cNvSpPr>
-            <a:spLocks noGrp="1"/>
-          </p:cNvSpPr>
-          <p:nvPr>
-            <p:ph type="sldNum" sz="quarter" idx="12"/>
-          </p:nvPr>
-        </p:nvSpPr>
-        <p:spPr>
-          <a:xfrm>
-            <a:off x="9579428" y="6356350"/>
-            <a:ext cx="1774371" cy="365125"/>
-          </a:xfrm>
-        </p:spPr>
-        <p:txBody>
-          <a:bodyPr/>
-          <a:lstStyle/>
-          <a:p>
-            <a:fld id="{A49DFD55-3C28-40EF-9E31-A92D2E4017FF}" type="slidenum">
-              <a:rPr lang="en-US" smtClean="0"/>
-              <a:pPr/>
-              <a:t>12</a:t>
             </a:fld>
             <a:endParaRPr lang="en-US" dirty="0"/>
           </a:p>
@@ -10971,7 +10769,15 @@
             </a:pPr>
             <a:r>
               <a:rPr lang="en-US" sz="2400" dirty="0"/>
-              <a:t>Analyzed aircraft accident data from NTSB (1962-2022)</a:t>
+              <a:t>Analyzed aircraft accident data </a:t>
+            </a:r>
+            <a:r>
+              <a:rPr lang="en-US" sz="2400"/>
+              <a:t>from National </a:t>
+            </a:r>
+            <a:r>
+              <a:rPr lang="en-US" sz="2400" dirty="0"/>
+              <a:t>Transportation Safety Board (1962-2022)</a:t>
             </a:r>
           </a:p>
           <a:p>
@@ -11045,7 +10851,7 @@
 </file>
 
 <file path=ppt/slides/slide6.xml><?xml version="1.0" encoding="utf-8"?>
-<p:sld xmlns:a="http://schemas.openxmlformats.org/drawingml/2006/main" xmlns:r="http://schemas.openxmlformats.org/officeDocument/2006/relationships" xmlns:p="http://schemas.openxmlformats.org/presentationml/2006/main" show="0">
+<p:sld xmlns:a="http://schemas.openxmlformats.org/drawingml/2006/main" xmlns:r="http://schemas.openxmlformats.org/officeDocument/2006/relationships" xmlns:p="http://schemas.openxmlformats.org/presentationml/2006/main">
   <p:cSld>
     <p:spTree>
       <p:nvGrpSpPr>
@@ -11063,24 +10869,24 @@
       </p:grpSpPr>
       <p:sp>
         <p:nvSpPr>
-          <p:cNvPr id="24" name="Footer Placeholder 23">
-            <a:extLst>
-              <a:ext uri="{FF2B5EF4-FFF2-40B4-BE49-F238E27FC236}">
-                <a16:creationId xmlns:a16="http://schemas.microsoft.com/office/drawing/2014/main" id="{918C3C97-444D-4600-8553-B9C4C1F8483B}"/>
-              </a:ext>
-            </a:extLst>
-          </p:cNvPr>
-          <p:cNvSpPr>
-            <a:spLocks noGrp="1"/>
-          </p:cNvSpPr>
-          <p:nvPr>
-            <p:ph type="ftr" sz="quarter" idx="11"/>
-          </p:nvPr>
-        </p:nvSpPr>
-        <p:spPr>
-          <a:xfrm>
-            <a:off x="4038600" y="6356350"/>
-            <a:ext cx="4114800" cy="365125"/>
+          <p:cNvPr id="3" name="Title 2">
+            <a:extLst>
+              <a:ext uri="{FF2B5EF4-FFF2-40B4-BE49-F238E27FC236}">
+                <a16:creationId xmlns:a16="http://schemas.microsoft.com/office/drawing/2014/main" id="{77762301-F83A-4BEA-9D11-E6C99FB574A8}"/>
+              </a:ext>
+            </a:extLst>
+          </p:cNvPr>
+          <p:cNvSpPr>
+            <a:spLocks noGrp="1"/>
+          </p:cNvSpPr>
+          <p:nvPr>
+            <p:ph type="title"/>
+          </p:nvPr>
+        </p:nvSpPr>
+        <p:spPr>
+          <a:xfrm>
+            <a:off x="838200" y="31434"/>
+            <a:ext cx="10515600" cy="549275"/>
           </a:xfrm>
         </p:spPr>
         <p:txBody>
@@ -11088,18 +10894,18 @@
           <a:lstStyle/>
           <a:p>
             <a:r>
-              <a:rPr lang="en-US" sz="1000" dirty="0"/>
-              <a:t>Just kidding, Daniel!!!</a:t>
-            </a:r>
-          </a:p>
-        </p:txBody>
-      </p:sp>
-      <p:sp>
-        <p:nvSpPr>
-          <p:cNvPr id="25" name="Slide Number Placeholder 24">
-            <a:extLst>
-              <a:ext uri="{FF2B5EF4-FFF2-40B4-BE49-F238E27FC236}">
-                <a16:creationId xmlns:a16="http://schemas.microsoft.com/office/drawing/2014/main" id="{148E9129-4CC6-47BA-ACD8-2C632A8660EC}"/>
+              <a:rPr lang="en-US" dirty="0"/>
+              <a:t>Accidents vs. Uninjured per Make</a:t>
+            </a:r>
+          </a:p>
+        </p:txBody>
+      </p:sp>
+      <p:sp>
+        <p:nvSpPr>
+          <p:cNvPr id="8" name="Slide Number Placeholder 7">
+            <a:extLst>
+              <a:ext uri="{FF2B5EF4-FFF2-40B4-BE49-F238E27FC236}">
+                <a16:creationId xmlns:a16="http://schemas.microsoft.com/office/drawing/2014/main" id="{92908AF9-2A07-4B50-BC13-471792106EC8}"/>
               </a:ext>
             </a:extLst>
           </p:cNvPr>
@@ -11129,125 +10935,40 @@
           </a:p>
         </p:txBody>
       </p:sp>
-      <p:sp>
-        <p:nvSpPr>
-          <p:cNvPr id="5" name="Title 4">
-            <a:extLst>
-              <a:ext uri="{FF2B5EF4-FFF2-40B4-BE49-F238E27FC236}">
-                <a16:creationId xmlns:a16="http://schemas.microsoft.com/office/drawing/2014/main" id="{BA01448C-258E-A52B-D225-6E4814A455F8}"/>
-              </a:ext>
-            </a:extLst>
-          </p:cNvPr>
-          <p:cNvSpPr>
-            <a:spLocks noGrp="1"/>
-          </p:cNvSpPr>
-          <p:nvPr>
-            <p:ph type="title"/>
-          </p:nvPr>
-        </p:nvSpPr>
-        <p:spPr>
-          <a:xfrm>
-            <a:off x="1137735" y="550271"/>
-            <a:ext cx="2615282" cy="1325563"/>
-          </a:xfrm>
-        </p:spPr>
-        <p:txBody>
-          <a:bodyPr/>
-          <a:lstStyle/>
-          <a:p>
-            <a:r>
-              <a:rPr lang="en-US" dirty="0"/>
-              <a:t>Results</a:t>
-            </a:r>
-          </a:p>
-        </p:txBody>
-      </p:sp>
       <p:pic>
         <p:nvPicPr>
-          <p:cNvPr id="1026" name="Picture 2">
-            <a:extLst>
-              <a:ext uri="{FF2B5EF4-FFF2-40B4-BE49-F238E27FC236}">
-                <a16:creationId xmlns:a16="http://schemas.microsoft.com/office/drawing/2014/main" id="{43340939-926C-CF48-CFC8-7971F5994345}"/>
+          <p:cNvPr id="4" name="Picture 3" descr="Diagram showing Accidents vs. Uninjured per Make">
+            <a:extLst>
+              <a:ext uri="{FF2B5EF4-FFF2-40B4-BE49-F238E27FC236}">
+                <a16:creationId xmlns:a16="http://schemas.microsoft.com/office/drawing/2014/main" id="{016A9887-C237-2739-B56E-57FFC9D5A628}"/>
               </a:ext>
             </a:extLst>
           </p:cNvPr>
           <p:cNvPicPr>
-            <a:picLocks noChangeAspect="1" noChangeArrowheads="1"/>
+            <a:picLocks noChangeAspect="1"/>
           </p:cNvPicPr>
           <p:nvPr/>
         </p:nvPicPr>
         <p:blipFill>
-          <a:blip r:embed="rId2">
-            <a:extLst>
-              <a:ext uri="{28A0092B-C50C-407E-A947-70E740481C1C}">
-                <a14:useLocalDpi xmlns:a14="http://schemas.microsoft.com/office/drawing/2010/main" val="0"/>
-              </a:ext>
-            </a:extLst>
-          </a:blip>
-          <a:srcRect/>
+          <a:blip r:embed="rId2"/>
           <a:stretch>
             <a:fillRect/>
           </a:stretch>
         </p:blipFill>
-        <p:spPr bwMode="auto">
-          <a:xfrm>
-            <a:off x="5406888" y="954157"/>
-            <a:ext cx="6359930" cy="4408996"/>
+        <p:spPr>
+          <a:xfrm>
+            <a:off x="2257227" y="580709"/>
+            <a:ext cx="7677545" cy="6140766"/>
           </a:xfrm>
           <a:prstGeom prst="rect">
             <a:avLst/>
           </a:prstGeom>
-          <a:noFill/>
-          <a:extLst>
-            <a:ext uri="{909E8E84-426E-40DD-AFC4-6F175D3DCCD1}">
-              <a14:hiddenFill xmlns:a14="http://schemas.microsoft.com/office/drawing/2010/main">
-                <a:solidFill>
-                  <a:srgbClr val="FFFFFF"/>
-                </a:solidFill>
-              </a14:hiddenFill>
-            </a:ext>
-          </a:extLst>
         </p:spPr>
       </p:pic>
-      <p:sp>
-        <p:nvSpPr>
-          <p:cNvPr id="46" name="TextBox 45">
-            <a:extLst>
-              <a:ext uri="{FF2B5EF4-FFF2-40B4-BE49-F238E27FC236}">
-                <a16:creationId xmlns:a16="http://schemas.microsoft.com/office/drawing/2014/main" id="{74C6D1C2-C9FA-C343-43F5-B1C58BB3C928}"/>
-              </a:ext>
-            </a:extLst>
-          </p:cNvPr>
-          <p:cNvSpPr txBox="1"/>
-          <p:nvPr/>
-        </p:nvSpPr>
-        <p:spPr>
-          <a:xfrm>
-            <a:off x="628153" y="3138551"/>
-            <a:ext cx="4214191" cy="369332"/>
-          </a:xfrm>
-          <a:prstGeom prst="rect">
-            <a:avLst/>
-          </a:prstGeom>
-          <a:noFill/>
-        </p:spPr>
-        <p:txBody>
-          <a:bodyPr wrap="square" rtlCol="0">
-            <a:spAutoFit/>
-          </a:bodyPr>
-          <a:lstStyle/>
-          <a:p>
-            <a:r>
-              <a:rPr lang="en-US" dirty="0"/>
-              <a:t>All the results here.</a:t>
-            </a:r>
-          </a:p>
-        </p:txBody>
-      </p:sp>
     </p:spTree>
     <p:extLst>
       <p:ext uri="{BB962C8B-B14F-4D97-AF65-F5344CB8AC3E}">
-        <p14:creationId xmlns:p14="http://schemas.microsoft.com/office/powerpoint/2010/main" val="2619301236"/>
+        <p14:creationId xmlns:p14="http://schemas.microsoft.com/office/powerpoint/2010/main" val="2896385493"/>
       </p:ext>
     </p:extLst>
   </p:cSld>
@@ -11276,10 +10997,10 @@
       </p:grpSpPr>
       <p:sp>
         <p:nvSpPr>
-          <p:cNvPr id="3" name="Title 2">
-            <a:extLst>
-              <a:ext uri="{FF2B5EF4-FFF2-40B4-BE49-F238E27FC236}">
-                <a16:creationId xmlns:a16="http://schemas.microsoft.com/office/drawing/2014/main" id="{77762301-F83A-4BEA-9D11-E6C99FB574A8}"/>
+          <p:cNvPr id="2" name="Title 1">
+            <a:extLst>
+              <a:ext uri="{FF2B5EF4-FFF2-40B4-BE49-F238E27FC236}">
+                <a16:creationId xmlns:a16="http://schemas.microsoft.com/office/drawing/2014/main" id="{FA93DB88-62DD-4C41-977F-D59BEF14EE76}"/>
               </a:ext>
             </a:extLst>
           </p:cNvPr>
@@ -11292,27 +11013,29 @@
         </p:nvSpPr>
         <p:spPr>
           <a:xfrm>
-            <a:off x="838200" y="31434"/>
-            <a:ext cx="10515600" cy="549275"/>
-          </a:xfrm>
-        </p:spPr>
-        <p:txBody>
-          <a:bodyPr/>
+            <a:off x="2419546" y="312450"/>
+            <a:ext cx="7352908" cy="585788"/>
+          </a:xfrm>
+        </p:spPr>
+        <p:txBody>
+          <a:bodyPr>
+            <a:normAutofit fontScale="90000"/>
+          </a:bodyPr>
           <a:lstStyle/>
           <a:p>
             <a:r>
               <a:rPr lang="en-US" dirty="0"/>
-              <a:t>Accidents vs. Uninjured per Make</a:t>
-            </a:r>
-          </a:p>
-        </p:txBody>
-      </p:sp>
-      <p:sp>
-        <p:nvSpPr>
-          <p:cNvPr id="8" name="Slide Number Placeholder 7">
-            <a:extLst>
-              <a:ext uri="{FF2B5EF4-FFF2-40B4-BE49-F238E27FC236}">
-                <a16:creationId xmlns:a16="http://schemas.microsoft.com/office/drawing/2014/main" id="{92908AF9-2A07-4B50-BC13-471792106EC8}"/>
+              <a:t>Purpose of flight vs. Average Uninjured</a:t>
+            </a:r>
+          </a:p>
+        </p:txBody>
+      </p:sp>
+      <p:sp>
+        <p:nvSpPr>
+          <p:cNvPr id="18" name="Slide Number Placeholder 17">
+            <a:extLst>
+              <a:ext uri="{FF2B5EF4-FFF2-40B4-BE49-F238E27FC236}">
+                <a16:creationId xmlns:a16="http://schemas.microsoft.com/office/drawing/2014/main" id="{C8D6D0E8-3983-4B7D-ADB2-077E17AD3BD0}"/>
               </a:ext>
             </a:extLst>
           </p:cNvPr>
@@ -11325,8 +11048,8 @@
         </p:nvSpPr>
         <p:spPr>
           <a:xfrm>
-            <a:off x="8610600" y="6356350"/>
-            <a:ext cx="2743200" cy="365125"/>
+            <a:off x="10810874" y="6356350"/>
+            <a:ext cx="542925" cy="365125"/>
           </a:xfrm>
         </p:spPr>
         <p:txBody>
@@ -11342,12 +11065,47 @@
           </a:p>
         </p:txBody>
       </p:sp>
+      <p:sp>
+        <p:nvSpPr>
+          <p:cNvPr id="32" name="TextBox 31">
+            <a:extLst>
+              <a:ext uri="{FF2B5EF4-FFF2-40B4-BE49-F238E27FC236}">
+                <a16:creationId xmlns:a16="http://schemas.microsoft.com/office/drawing/2014/main" id="{D9383D59-DCF4-5CE5-ABFF-F12B8A5D57D3}"/>
+              </a:ext>
+            </a:extLst>
+          </p:cNvPr>
+          <p:cNvSpPr txBox="1"/>
+          <p:nvPr/>
+        </p:nvSpPr>
+        <p:spPr>
+          <a:xfrm>
+            <a:off x="7729978" y="3105834"/>
+            <a:ext cx="4199067" cy="923330"/>
+          </a:xfrm>
+          <a:prstGeom prst="rect">
+            <a:avLst/>
+          </a:prstGeom>
+          <a:noFill/>
+        </p:spPr>
+        <p:txBody>
+          <a:bodyPr wrap="square" rtlCol="0">
+            <a:spAutoFit/>
+          </a:bodyPr>
+          <a:lstStyle/>
+          <a:p>
+            <a:r>
+              <a:rPr lang="en-US" dirty="0"/>
+              <a:t>Personal flights have a relatively low average of uninjured passengers when involved in an accident</a:t>
+            </a:r>
+          </a:p>
+        </p:txBody>
+      </p:sp>
       <p:pic>
         <p:nvPicPr>
-          <p:cNvPr id="4" name="Picture 3" descr="Diagram showing Accidents vs. Uninjured per Make">
-            <a:extLst>
-              <a:ext uri="{FF2B5EF4-FFF2-40B4-BE49-F238E27FC236}">
-                <a16:creationId xmlns:a16="http://schemas.microsoft.com/office/drawing/2014/main" id="{016A9887-C237-2739-B56E-57FFC9D5A628}"/>
+          <p:cNvPr id="6" name="Picture 5" descr="A graph of a bar graph&#10;&#10;Description automatically generated with medium confidence">
+            <a:extLst>
+              <a:ext uri="{FF2B5EF4-FFF2-40B4-BE49-F238E27FC236}">
+                <a16:creationId xmlns:a16="http://schemas.microsoft.com/office/drawing/2014/main" id="{D4657AE6-6A40-ABFE-A49F-0A985EC9566B}"/>
               </a:ext>
             </a:extLst>
           </p:cNvPr>
@@ -11364,8 +11122,8 @@
         </p:blipFill>
         <p:spPr>
           <a:xfrm>
-            <a:off x="2257227" y="580709"/>
-            <a:ext cx="7677545" cy="6140766"/>
+            <a:off x="270824" y="1786746"/>
+            <a:ext cx="7110076" cy="3284505"/>
           </a:xfrm>
           <a:prstGeom prst="rect">
             <a:avLst/>
@@ -11375,7 +11133,7 @@
     </p:spTree>
     <p:extLst>
       <p:ext uri="{BB962C8B-B14F-4D97-AF65-F5344CB8AC3E}">
-        <p14:creationId xmlns:p14="http://schemas.microsoft.com/office/powerpoint/2010/main" val="2896385493"/>
+        <p14:creationId xmlns:p14="http://schemas.microsoft.com/office/powerpoint/2010/main" val="332104327"/>
       </p:ext>
     </p:extLst>
   </p:cSld>
@@ -11407,7 +11165,7 @@
           <p:cNvPr id="2" name="Title 1">
             <a:extLst>
               <a:ext uri="{FF2B5EF4-FFF2-40B4-BE49-F238E27FC236}">
-                <a16:creationId xmlns:a16="http://schemas.microsoft.com/office/drawing/2014/main" id="{FA93DB88-62DD-4C41-977F-D59BEF14EE76}"/>
+                <a16:creationId xmlns:a16="http://schemas.microsoft.com/office/drawing/2014/main" id="{09140014-73D5-419B-8867-972BB18D52D4}"/>
               </a:ext>
             </a:extLst>
           </p:cNvPr>
@@ -11420,29 +11178,68 @@
         </p:nvSpPr>
         <p:spPr>
           <a:xfrm>
-            <a:off x="2419546" y="312450"/>
-            <a:ext cx="7352908" cy="585788"/>
+            <a:off x="3028643" y="469132"/>
+            <a:ext cx="6134714" cy="782833"/>
+          </a:xfrm>
+        </p:spPr>
+        <p:txBody>
+          <a:bodyPr/>
+          <a:lstStyle/>
+          <a:p>
+            <a:r>
+              <a:rPr lang="en-US" dirty="0"/>
+              <a:t>Fatalities vs. Phase of Flight</a:t>
+            </a:r>
+          </a:p>
+        </p:txBody>
+      </p:sp>
+      <p:sp>
+        <p:nvSpPr>
+          <p:cNvPr id="4" name="Content Placeholder 3">
+            <a:extLst>
+              <a:ext uri="{FF2B5EF4-FFF2-40B4-BE49-F238E27FC236}">
+                <a16:creationId xmlns:a16="http://schemas.microsoft.com/office/drawing/2014/main" id="{33D8731E-4977-402E-8BFD-895B4D0544CC}"/>
+              </a:ext>
+            </a:extLst>
+          </p:cNvPr>
+          <p:cNvSpPr>
+            <a:spLocks noGrp="1"/>
+          </p:cNvSpPr>
+          <p:nvPr>
+            <p:ph sz="half" idx="2"/>
+          </p:nvPr>
+        </p:nvSpPr>
+        <p:spPr>
+          <a:xfrm>
+            <a:off x="1931687" y="2766218"/>
+            <a:ext cx="2683331" cy="1325563"/>
           </a:xfrm>
         </p:spPr>
         <p:txBody>
           <a:bodyPr>
-            <a:normAutofit fontScale="90000"/>
+            <a:normAutofit/>
           </a:bodyPr>
           <a:lstStyle/>
           <a:p>
             <a:r>
               <a:rPr lang="en-US" dirty="0"/>
-              <a:t>Purpose of flight vs. Average Uninjured</a:t>
-            </a:r>
-          </a:p>
-        </p:txBody>
-      </p:sp>
-      <p:sp>
-        <p:nvSpPr>
-          <p:cNvPr id="18" name="Slide Number Placeholder 17">
-            <a:extLst>
-              <a:ext uri="{FF2B5EF4-FFF2-40B4-BE49-F238E27FC236}">
-                <a16:creationId xmlns:a16="http://schemas.microsoft.com/office/drawing/2014/main" id="{C8D6D0E8-3983-4B7D-ADB2-077E17AD3BD0}"/>
+              <a:t>Cruise, Approach, &amp; Takeoff have highest injury rate</a:t>
+            </a:r>
+          </a:p>
+          <a:p>
+            <a:r>
+              <a:rPr lang="en-US" dirty="0"/>
+              <a:t>Insight on additional training &amp; safety measures at high-risk points of the flight</a:t>
+            </a:r>
+          </a:p>
+        </p:txBody>
+      </p:sp>
+      <p:sp>
+        <p:nvSpPr>
+          <p:cNvPr id="9" name="Slide Number Placeholder 8">
+            <a:extLst>
+              <a:ext uri="{FF2B5EF4-FFF2-40B4-BE49-F238E27FC236}">
+                <a16:creationId xmlns:a16="http://schemas.microsoft.com/office/drawing/2014/main" id="{C396FFDC-ADE8-4009-A466-A81787258E88}"/>
               </a:ext>
             </a:extLst>
           </p:cNvPr>
@@ -11455,8 +11252,8 @@
         </p:nvSpPr>
         <p:spPr>
           <a:xfrm>
-            <a:off x="10810874" y="6356350"/>
-            <a:ext cx="542925" cy="365125"/>
+            <a:off x="8610600" y="6356350"/>
+            <a:ext cx="2743200" cy="365125"/>
           </a:xfrm>
         </p:spPr>
         <p:txBody>
@@ -11472,47 +11269,12 @@
           </a:p>
         </p:txBody>
       </p:sp>
-      <p:sp>
-        <p:nvSpPr>
-          <p:cNvPr id="32" name="TextBox 31">
-            <a:extLst>
-              <a:ext uri="{FF2B5EF4-FFF2-40B4-BE49-F238E27FC236}">
-                <a16:creationId xmlns:a16="http://schemas.microsoft.com/office/drawing/2014/main" id="{D9383D59-DCF4-5CE5-ABFF-F12B8A5D57D3}"/>
-              </a:ext>
-            </a:extLst>
-          </p:cNvPr>
-          <p:cNvSpPr txBox="1"/>
-          <p:nvPr/>
-        </p:nvSpPr>
-        <p:spPr>
-          <a:xfrm>
-            <a:off x="7729978" y="3105834"/>
-            <a:ext cx="4199067" cy="923330"/>
-          </a:xfrm>
-          <a:prstGeom prst="rect">
-            <a:avLst/>
-          </a:prstGeom>
-          <a:noFill/>
-        </p:spPr>
-        <p:txBody>
-          <a:bodyPr wrap="square" rtlCol="0">
-            <a:spAutoFit/>
-          </a:bodyPr>
-          <a:lstStyle/>
-          <a:p>
-            <a:r>
-              <a:rPr lang="en-US" dirty="0"/>
-              <a:t>Personal flights have a relatively low average of uninjured passengers when involved in an accident</a:t>
-            </a:r>
-          </a:p>
-        </p:txBody>
-      </p:sp>
       <p:pic>
         <p:nvPicPr>
-          <p:cNvPr id="6" name="Picture 5" descr="A graph of a bar graph&#10;&#10;Description automatically generated with medium confidence">
-            <a:extLst>
-              <a:ext uri="{FF2B5EF4-FFF2-40B4-BE49-F238E27FC236}">
-                <a16:creationId xmlns:a16="http://schemas.microsoft.com/office/drawing/2014/main" id="{D4657AE6-6A40-ABFE-A49F-0A985EC9566B}"/>
+          <p:cNvPr id="7" name="Picture 6" descr="Bar chart showing fatalities vs. phase of flight">
+            <a:extLst>
+              <a:ext uri="{FF2B5EF4-FFF2-40B4-BE49-F238E27FC236}">
+                <a16:creationId xmlns:a16="http://schemas.microsoft.com/office/drawing/2014/main" id="{D5AF37D3-8F8B-749D-8D2D-64BECEA76D06}"/>
               </a:ext>
             </a:extLst>
           </p:cNvPr>
@@ -11529,8 +11291,8 @@
         </p:blipFill>
         <p:spPr>
           <a:xfrm>
-            <a:off x="270824" y="1786746"/>
-            <a:ext cx="7110076" cy="3284505"/>
+            <a:off x="4949072" y="1251965"/>
+            <a:ext cx="6709591" cy="5104385"/>
           </a:xfrm>
           <a:prstGeom prst="rect">
             <a:avLst/>
@@ -11540,7 +11302,7 @@
     </p:spTree>
     <p:extLst>
       <p:ext uri="{BB962C8B-B14F-4D97-AF65-F5344CB8AC3E}">
-        <p14:creationId xmlns:p14="http://schemas.microsoft.com/office/powerpoint/2010/main" val="332104327"/>
+        <p14:creationId xmlns:p14="http://schemas.microsoft.com/office/powerpoint/2010/main" val="1663780162"/>
       </p:ext>
     </p:extLst>
   </p:cSld>
@@ -11572,7 +11334,7 @@
           <p:cNvPr id="2" name="Title 1">
             <a:extLst>
               <a:ext uri="{FF2B5EF4-FFF2-40B4-BE49-F238E27FC236}">
-                <a16:creationId xmlns:a16="http://schemas.microsoft.com/office/drawing/2014/main" id="{09140014-73D5-419B-8867-972BB18D52D4}"/>
+                <a16:creationId xmlns:a16="http://schemas.microsoft.com/office/drawing/2014/main" id="{42DD0E59-4C68-4F87-9821-23C69713D980}"/>
               </a:ext>
             </a:extLst>
           </p:cNvPr>
@@ -11585,8 +11347,8 @@
         </p:nvSpPr>
         <p:spPr>
           <a:xfrm>
-            <a:off x="3028643" y="469132"/>
-            <a:ext cx="6134714" cy="782833"/>
+            <a:off x="4222142" y="399196"/>
+            <a:ext cx="3458818" cy="888915"/>
           </a:xfrm>
         </p:spPr>
         <p:txBody>
@@ -11595,58 +11357,17 @@
           <a:p>
             <a:r>
               <a:rPr lang="en-US" dirty="0"/>
-              <a:t>Fatalities vs. Phase of Flight</a:t>
-            </a:r>
-          </a:p>
-        </p:txBody>
-      </p:sp>
-      <p:sp>
-        <p:nvSpPr>
-          <p:cNvPr id="4" name="Content Placeholder 3">
-            <a:extLst>
-              <a:ext uri="{FF2B5EF4-FFF2-40B4-BE49-F238E27FC236}">
-                <a16:creationId xmlns:a16="http://schemas.microsoft.com/office/drawing/2014/main" id="{33D8731E-4977-402E-8BFD-895B4D0544CC}"/>
-              </a:ext>
-            </a:extLst>
-          </p:cNvPr>
-          <p:cNvSpPr>
-            <a:spLocks noGrp="1"/>
-          </p:cNvSpPr>
-          <p:nvPr>
-            <p:ph sz="half" idx="2"/>
-          </p:nvPr>
-        </p:nvSpPr>
-        <p:spPr>
-          <a:xfrm>
-            <a:off x="1931687" y="2766218"/>
-            <a:ext cx="2683331" cy="1325563"/>
-          </a:xfrm>
-        </p:spPr>
-        <p:txBody>
-          <a:bodyPr>
-            <a:normAutofit/>
-          </a:bodyPr>
-          <a:lstStyle/>
-          <a:p>
-            <a:r>
-              <a:rPr lang="en-US" dirty="0"/>
-              <a:t>Cruise, Approach, &amp; Takeoff have highest injury rate</a:t>
-            </a:r>
-          </a:p>
-          <a:p>
-            <a:r>
-              <a:rPr lang="en-US" dirty="0"/>
-              <a:t>Insight on additional training &amp; safety measures at high-risk points of the flight</a:t>
-            </a:r>
-          </a:p>
-        </p:txBody>
-      </p:sp>
-      <p:sp>
-        <p:nvSpPr>
-          <p:cNvPr id="9" name="Slide Number Placeholder 8">
-            <a:extLst>
-              <a:ext uri="{FF2B5EF4-FFF2-40B4-BE49-F238E27FC236}">
-                <a16:creationId xmlns:a16="http://schemas.microsoft.com/office/drawing/2014/main" id="{C396FFDC-ADE8-4009-A466-A81787258E88}"/>
+              <a:t>Conclusions</a:t>
+            </a:r>
+          </a:p>
+        </p:txBody>
+      </p:sp>
+      <p:sp>
+        <p:nvSpPr>
+          <p:cNvPr id="58" name="Slide Number Placeholder 57">
+            <a:extLst>
+              <a:ext uri="{FF2B5EF4-FFF2-40B4-BE49-F238E27FC236}">
+                <a16:creationId xmlns:a16="http://schemas.microsoft.com/office/drawing/2014/main" id="{E1900601-8B04-4FF3-B06F-6BEFAC6556D3}"/>
               </a:ext>
             </a:extLst>
           </p:cNvPr>
@@ -11676,12 +11397,85 @@
           </a:p>
         </p:txBody>
       </p:sp>
+      <p:sp>
+        <p:nvSpPr>
+          <p:cNvPr id="325" name="TextBox 324">
+            <a:extLst>
+              <a:ext uri="{FF2B5EF4-FFF2-40B4-BE49-F238E27FC236}">
+                <a16:creationId xmlns:a16="http://schemas.microsoft.com/office/drawing/2014/main" id="{A42B02C5-FE29-188B-9830-F2636DAA46B5}"/>
+              </a:ext>
+            </a:extLst>
+          </p:cNvPr>
+          <p:cNvSpPr txBox="1"/>
+          <p:nvPr/>
+        </p:nvSpPr>
+        <p:spPr>
+          <a:xfrm>
+            <a:off x="1484242" y="1270215"/>
+            <a:ext cx="5983358" cy="1938992"/>
+          </a:xfrm>
+          <a:prstGeom prst="rect">
+            <a:avLst/>
+          </a:prstGeom>
+          <a:noFill/>
+        </p:spPr>
+        <p:txBody>
+          <a:bodyPr wrap="square" rtlCol="0">
+            <a:spAutoFit/>
+          </a:bodyPr>
+          <a:lstStyle/>
+          <a:p>
+            <a:pPr marL="342900" indent="-342900">
+              <a:buFont typeface="Arial" panose="020B0604020202020204" pitchFamily="34" charset="0"/>
+              <a:buChar char="•"/>
+            </a:pPr>
+            <a:r>
+              <a:rPr lang="en-US" sz="2000" dirty="0"/>
+              <a:t>For smaller airplanes, invest in Cessna or Piper</a:t>
+            </a:r>
+          </a:p>
+          <a:p>
+            <a:pPr marL="342900" indent="-342900">
+              <a:buFont typeface="Arial" panose="020B0604020202020204" pitchFamily="34" charset="0"/>
+              <a:buChar char="•"/>
+            </a:pPr>
+            <a:endParaRPr lang="en-US" sz="2000" dirty="0"/>
+          </a:p>
+          <a:p>
+            <a:pPr marL="342900" indent="-342900">
+              <a:buFont typeface="Arial" panose="020B0604020202020204" pitchFamily="34" charset="0"/>
+              <a:buChar char="•"/>
+            </a:pPr>
+            <a:r>
+              <a:rPr lang="en-US" sz="2000" dirty="0"/>
+              <a:t>For larger airplanes, invest in Boeing</a:t>
+            </a:r>
+          </a:p>
+          <a:p>
+            <a:pPr marL="342900" indent="-342900">
+              <a:buFont typeface="Arial" panose="020B0604020202020204" pitchFamily="34" charset="0"/>
+              <a:buChar char="•"/>
+            </a:pPr>
+            <a:endParaRPr lang="en-US" sz="2000" dirty="0"/>
+          </a:p>
+          <a:p>
+            <a:pPr marL="342900" indent="-342900">
+              <a:buFont typeface="Arial" panose="020B0604020202020204" pitchFamily="34" charset="0"/>
+              <a:buChar char="•"/>
+            </a:pPr>
+            <a:r>
+              <a:rPr lang="en-US" sz="2000" dirty="0"/>
+              <a:t>Focus on extra safety measures during cruise, approach, &amp; takeoff</a:t>
+            </a:r>
+          </a:p>
+        </p:txBody>
+      </p:sp>
       <p:pic>
         <p:nvPicPr>
-          <p:cNvPr id="7" name="Picture 6">
-            <a:extLst>
-              <a:ext uri="{FF2B5EF4-FFF2-40B4-BE49-F238E27FC236}">
-                <a16:creationId xmlns:a16="http://schemas.microsoft.com/office/drawing/2014/main" id="{D5AF37D3-8F8B-749D-8D2D-64BECEA76D06}"/>
+          <p:cNvPr id="328" name="Picture 327" descr="A group of airplanes flying in the sky&#10;&#10;Description automatically generated">
+            <a:extLst>
+              <a:ext uri="{FF2B5EF4-FFF2-40B4-BE49-F238E27FC236}">
+                <a16:creationId xmlns:a16="http://schemas.microsoft.com/office/drawing/2014/main" id="{DA03C357-BEEF-04FF-AD93-4A8CB4B23F95}"/>
               </a:ext>
             </a:extLst>
           </p:cNvPr>
@@ -11698,8 +11492,8 @@
         </p:blipFill>
         <p:spPr>
           <a:xfrm>
-            <a:off x="4949072" y="1251965"/>
-            <a:ext cx="6709591" cy="5104385"/>
+            <a:off x="5394297" y="3429000"/>
+            <a:ext cx="5462546" cy="3072682"/>
           </a:xfrm>
           <a:prstGeom prst="rect">
             <a:avLst/>
@@ -11709,7 +11503,7 @@
     </p:spTree>
     <p:extLst>
       <p:ext uri="{BB962C8B-B14F-4D97-AF65-F5344CB8AC3E}">
-        <p14:creationId xmlns:p14="http://schemas.microsoft.com/office/powerpoint/2010/main" val="1663780162"/>
+        <p14:creationId xmlns:p14="http://schemas.microsoft.com/office/powerpoint/2010/main" val="4055079983"/>
       </p:ext>
     </p:extLst>
   </p:cSld>
@@ -12854,11 +12648,18 @@
 <file path=customXml/itemProps1.xml><?xml version="1.0" encoding="utf-8"?>
 <ds:datastoreItem xmlns:ds="http://schemas.openxmlformats.org/officeDocument/2006/customXml" ds:itemID="{4CC7F809-A434-4A8D-A127-1C50C2DB3890}">
   <ds:schemaRefs>
+    <ds:schemaRef ds:uri="http://purl.org/dc/terms/"/>
+    <ds:schemaRef ds:uri="230e9df3-be65-4c73-a93b-d1236ebd677e"/>
+    <ds:schemaRef ds:uri="http://schemas.microsoft.com/office/infopath/2007/PartnerControls"/>
+    <ds:schemaRef ds:uri="http://schemas.openxmlformats.org/package/2006/metadata/core-properties"/>
+    <ds:schemaRef ds:uri="16c05727-aa75-4e4a-9b5f-8a80a1165891"/>
+    <ds:schemaRef ds:uri="http://schemas.microsoft.com/office/2006/documentManagement/types"/>
+    <ds:schemaRef ds:uri="http://purl.org/dc/elements/1.1/"/>
+    <ds:schemaRef ds:uri="71af3243-3dd4-4a8d-8c0d-dd76da1f02a5"/>
+    <ds:schemaRef ds:uri="http://www.w3.org/XML/1998/namespace"/>
+    <ds:schemaRef ds:uri="http://schemas.microsoft.com/sharepoint/v3"/>
     <ds:schemaRef ds:uri="http://schemas.microsoft.com/office/2006/metadata/properties"/>
-    <ds:schemaRef ds:uri="http://schemas.microsoft.com/office/infopath/2007/PartnerControls"/>
-    <ds:schemaRef ds:uri="http://schemas.microsoft.com/sharepoint/v3"/>
-    <ds:schemaRef ds:uri="71af3243-3dd4-4a8d-8c0d-dd76da1f02a5"/>
-    <ds:schemaRef ds:uri="230e9df3-be65-4c73-a93b-d1236ebd677e"/>
+    <ds:schemaRef ds:uri="http://purl.org/dc/dcmitype/"/>
   </ds:schemaRefs>
 </ds:datastoreItem>
 </file>

</xml_diff>